<commit_message>
LLD mais simples atualizado
</commit_message>
<xml_diff>
--- a/Documentacao/LLD_KPRunnin.pptx
+++ b/Documentacao/LLD_KPRunnin.pptx
@@ -5,7 +5,7 @@
     <p:sldMasterId id="2147483648" r:id="rId1"/>
   </p:sldMasterIdLst>
   <p:sldIdLst>
-    <p:sldId id="256" r:id="rId2"/>
+    <p:sldId id="257" r:id="rId2"/>
   </p:sldIdLst>
   <p:sldSz cx="12192000" cy="6858000"/>
   <p:notesSz cx="6858000" cy="9144000"/>
@@ -104,6 +104,11 @@
       </a:defRPr>
     </a:lvl9pPr>
   </p:defaultTextStyle>
+  <p:extLst>
+    <p:ext uri="{EFAFB233-063F-42B5-8137-9DF3F51BA10A}">
+      <p15:sldGuideLst xmlns:p15="http://schemas.microsoft.com/office/powerpoint/2012/main"/>
+    </p:ext>
+  </p:extLst>
 </p:presentation>
 </file>
 
@@ -129,7 +134,7 @@
           <p:cNvPr id="2" name="Título 1">
             <a:extLst>
               <a:ext uri="{FF2B5EF4-FFF2-40B4-BE49-F238E27FC236}">
-                <a16:creationId xmlns:a16="http://schemas.microsoft.com/office/drawing/2014/main" id="{BDB78601-2C20-4D88-A91E-F82CD857A5BF}"/>
+                <a16:creationId xmlns:a16="http://schemas.microsoft.com/office/drawing/2014/main" xmlns="" id="{BDB78601-2C20-4D88-A91E-F82CD857A5BF}"/>
               </a:ext>
             </a:extLst>
           </p:cNvPr>
@@ -166,7 +171,7 @@
           <p:cNvPr id="3" name="Subtítulo 2">
             <a:extLst>
               <a:ext uri="{FF2B5EF4-FFF2-40B4-BE49-F238E27FC236}">
-                <a16:creationId xmlns:a16="http://schemas.microsoft.com/office/drawing/2014/main" id="{56BCB7BD-CE13-49DA-BEA3-A095DA9D523A}"/>
+                <a16:creationId xmlns:a16="http://schemas.microsoft.com/office/drawing/2014/main" xmlns="" id="{56BCB7BD-CE13-49DA-BEA3-A095DA9D523A}"/>
               </a:ext>
             </a:extLst>
           </p:cNvPr>
@@ -236,7 +241,7 @@
           <p:cNvPr id="4" name="Espaço Reservado para Data 3">
             <a:extLst>
               <a:ext uri="{FF2B5EF4-FFF2-40B4-BE49-F238E27FC236}">
-                <a16:creationId xmlns:a16="http://schemas.microsoft.com/office/drawing/2014/main" id="{85BD4F0D-1459-4092-9622-7B03431AE9E7}"/>
+                <a16:creationId xmlns:a16="http://schemas.microsoft.com/office/drawing/2014/main" xmlns="" id="{85BD4F0D-1459-4092-9622-7B03431AE9E7}"/>
               </a:ext>
             </a:extLst>
           </p:cNvPr>
@@ -254,7 +259,7 @@
           <a:p>
             <a:fld id="{C55D88D1-7F48-4BE3-A3D3-4F639BB2942B}" type="datetimeFigureOut">
               <a:rPr lang="pt-BR" smtClean="0"/>
-              <a:t>10/04/2020</a:t>
+              <a:t>15/04/2020</a:t>
             </a:fld>
             <a:endParaRPr lang="pt-BR"/>
           </a:p>
@@ -265,7 +270,7 @@
           <p:cNvPr id="5" name="Espaço Reservado para Rodapé 4">
             <a:extLst>
               <a:ext uri="{FF2B5EF4-FFF2-40B4-BE49-F238E27FC236}">
-                <a16:creationId xmlns:a16="http://schemas.microsoft.com/office/drawing/2014/main" id="{303DB8DB-E4E4-44F0-88F3-96E17B43E9C1}"/>
+                <a16:creationId xmlns:a16="http://schemas.microsoft.com/office/drawing/2014/main" xmlns="" id="{303DB8DB-E4E4-44F0-88F3-96E17B43E9C1}"/>
               </a:ext>
             </a:extLst>
           </p:cNvPr>
@@ -290,7 +295,7 @@
           <p:cNvPr id="6" name="Espaço Reservado para Número de Slide 5">
             <a:extLst>
               <a:ext uri="{FF2B5EF4-FFF2-40B4-BE49-F238E27FC236}">
-                <a16:creationId xmlns:a16="http://schemas.microsoft.com/office/drawing/2014/main" id="{51CD12D0-D3CD-4AB6-977B-22A77F561C81}"/>
+                <a16:creationId xmlns:a16="http://schemas.microsoft.com/office/drawing/2014/main" xmlns="" id="{51CD12D0-D3CD-4AB6-977B-22A77F561C81}"/>
               </a:ext>
             </a:extLst>
           </p:cNvPr>
@@ -349,7 +354,7 @@
           <p:cNvPr id="2" name="Título 1">
             <a:extLst>
               <a:ext uri="{FF2B5EF4-FFF2-40B4-BE49-F238E27FC236}">
-                <a16:creationId xmlns:a16="http://schemas.microsoft.com/office/drawing/2014/main" id="{CD9D12D3-2DCD-4333-A9FB-D6CE404D618A}"/>
+                <a16:creationId xmlns:a16="http://schemas.microsoft.com/office/drawing/2014/main" xmlns="" id="{CD9D12D3-2DCD-4333-A9FB-D6CE404D618A}"/>
               </a:ext>
             </a:extLst>
           </p:cNvPr>
@@ -377,7 +382,7 @@
           <p:cNvPr id="3" name="Espaço Reservado para Texto Vertical 2">
             <a:extLst>
               <a:ext uri="{FF2B5EF4-FFF2-40B4-BE49-F238E27FC236}">
-                <a16:creationId xmlns:a16="http://schemas.microsoft.com/office/drawing/2014/main" id="{719DB248-DC5A-4DA2-B4D9-D37E2F168AFF}"/>
+                <a16:creationId xmlns:a16="http://schemas.microsoft.com/office/drawing/2014/main" xmlns="" id="{719DB248-DC5A-4DA2-B4D9-D37E2F168AFF}"/>
               </a:ext>
             </a:extLst>
           </p:cNvPr>
@@ -434,7 +439,7 @@
           <p:cNvPr id="4" name="Espaço Reservado para Data 3">
             <a:extLst>
               <a:ext uri="{FF2B5EF4-FFF2-40B4-BE49-F238E27FC236}">
-                <a16:creationId xmlns:a16="http://schemas.microsoft.com/office/drawing/2014/main" id="{200FD6AA-80C2-4839-9B42-DA5FB3A1C4A1}"/>
+                <a16:creationId xmlns:a16="http://schemas.microsoft.com/office/drawing/2014/main" xmlns="" id="{200FD6AA-80C2-4839-9B42-DA5FB3A1C4A1}"/>
               </a:ext>
             </a:extLst>
           </p:cNvPr>
@@ -452,7 +457,7 @@
           <a:p>
             <a:fld id="{C55D88D1-7F48-4BE3-A3D3-4F639BB2942B}" type="datetimeFigureOut">
               <a:rPr lang="pt-BR" smtClean="0"/>
-              <a:t>10/04/2020</a:t>
+              <a:t>15/04/2020</a:t>
             </a:fld>
             <a:endParaRPr lang="pt-BR"/>
           </a:p>
@@ -463,7 +468,7 @@
           <p:cNvPr id="5" name="Espaço Reservado para Rodapé 4">
             <a:extLst>
               <a:ext uri="{FF2B5EF4-FFF2-40B4-BE49-F238E27FC236}">
-                <a16:creationId xmlns:a16="http://schemas.microsoft.com/office/drawing/2014/main" id="{1A345876-ED8F-41AE-BFF1-7A8BFE284BDF}"/>
+                <a16:creationId xmlns:a16="http://schemas.microsoft.com/office/drawing/2014/main" xmlns="" id="{1A345876-ED8F-41AE-BFF1-7A8BFE284BDF}"/>
               </a:ext>
             </a:extLst>
           </p:cNvPr>
@@ -488,7 +493,7 @@
           <p:cNvPr id="6" name="Espaço Reservado para Número de Slide 5">
             <a:extLst>
               <a:ext uri="{FF2B5EF4-FFF2-40B4-BE49-F238E27FC236}">
-                <a16:creationId xmlns:a16="http://schemas.microsoft.com/office/drawing/2014/main" id="{8285296E-ABAE-491A-A9F0-B9DA7815B818}"/>
+                <a16:creationId xmlns:a16="http://schemas.microsoft.com/office/drawing/2014/main" xmlns="" id="{8285296E-ABAE-491A-A9F0-B9DA7815B818}"/>
               </a:ext>
             </a:extLst>
           </p:cNvPr>
@@ -547,7 +552,7 @@
           <p:cNvPr id="2" name="Título Vertical 1">
             <a:extLst>
               <a:ext uri="{FF2B5EF4-FFF2-40B4-BE49-F238E27FC236}">
-                <a16:creationId xmlns:a16="http://schemas.microsoft.com/office/drawing/2014/main" id="{70DCAB15-5180-4A21-8B47-B38DA25898ED}"/>
+                <a16:creationId xmlns:a16="http://schemas.microsoft.com/office/drawing/2014/main" xmlns="" id="{70DCAB15-5180-4A21-8B47-B38DA25898ED}"/>
               </a:ext>
             </a:extLst>
           </p:cNvPr>
@@ -580,7 +585,7 @@
           <p:cNvPr id="3" name="Espaço Reservado para Texto Vertical 2">
             <a:extLst>
               <a:ext uri="{FF2B5EF4-FFF2-40B4-BE49-F238E27FC236}">
-                <a16:creationId xmlns:a16="http://schemas.microsoft.com/office/drawing/2014/main" id="{2AB6EE70-DFA8-4150-8179-E104E526C502}"/>
+                <a16:creationId xmlns:a16="http://schemas.microsoft.com/office/drawing/2014/main" xmlns="" id="{2AB6EE70-DFA8-4150-8179-E104E526C502}"/>
               </a:ext>
             </a:extLst>
           </p:cNvPr>
@@ -642,7 +647,7 @@
           <p:cNvPr id="4" name="Espaço Reservado para Data 3">
             <a:extLst>
               <a:ext uri="{FF2B5EF4-FFF2-40B4-BE49-F238E27FC236}">
-                <a16:creationId xmlns:a16="http://schemas.microsoft.com/office/drawing/2014/main" id="{094FBCB4-562F-43F1-8602-F1F27E51C65C}"/>
+                <a16:creationId xmlns:a16="http://schemas.microsoft.com/office/drawing/2014/main" xmlns="" id="{094FBCB4-562F-43F1-8602-F1F27E51C65C}"/>
               </a:ext>
             </a:extLst>
           </p:cNvPr>
@@ -660,7 +665,7 @@
           <a:p>
             <a:fld id="{C55D88D1-7F48-4BE3-A3D3-4F639BB2942B}" type="datetimeFigureOut">
               <a:rPr lang="pt-BR" smtClean="0"/>
-              <a:t>10/04/2020</a:t>
+              <a:t>15/04/2020</a:t>
             </a:fld>
             <a:endParaRPr lang="pt-BR"/>
           </a:p>
@@ -671,7 +676,7 @@
           <p:cNvPr id="5" name="Espaço Reservado para Rodapé 4">
             <a:extLst>
               <a:ext uri="{FF2B5EF4-FFF2-40B4-BE49-F238E27FC236}">
-                <a16:creationId xmlns:a16="http://schemas.microsoft.com/office/drawing/2014/main" id="{51D47644-3CD4-409A-ABFF-FE6A625661BC}"/>
+                <a16:creationId xmlns:a16="http://schemas.microsoft.com/office/drawing/2014/main" xmlns="" id="{51D47644-3CD4-409A-ABFF-FE6A625661BC}"/>
               </a:ext>
             </a:extLst>
           </p:cNvPr>
@@ -696,7 +701,7 @@
           <p:cNvPr id="6" name="Espaço Reservado para Número de Slide 5">
             <a:extLst>
               <a:ext uri="{FF2B5EF4-FFF2-40B4-BE49-F238E27FC236}">
-                <a16:creationId xmlns:a16="http://schemas.microsoft.com/office/drawing/2014/main" id="{6F11B319-9AD8-496B-9329-C72826AC1F07}"/>
+                <a16:creationId xmlns:a16="http://schemas.microsoft.com/office/drawing/2014/main" xmlns="" id="{6F11B319-9AD8-496B-9329-C72826AC1F07}"/>
               </a:ext>
             </a:extLst>
           </p:cNvPr>
@@ -755,7 +760,7 @@
           <p:cNvPr id="2" name="Título 1">
             <a:extLst>
               <a:ext uri="{FF2B5EF4-FFF2-40B4-BE49-F238E27FC236}">
-                <a16:creationId xmlns:a16="http://schemas.microsoft.com/office/drawing/2014/main" id="{ED88EC2A-4D78-4955-97B8-9F67689EA4C4}"/>
+                <a16:creationId xmlns:a16="http://schemas.microsoft.com/office/drawing/2014/main" xmlns="" id="{ED88EC2A-4D78-4955-97B8-9F67689EA4C4}"/>
               </a:ext>
             </a:extLst>
           </p:cNvPr>
@@ -783,7 +788,7 @@
           <p:cNvPr id="3" name="Espaço Reservado para Conteúdo 2">
             <a:extLst>
               <a:ext uri="{FF2B5EF4-FFF2-40B4-BE49-F238E27FC236}">
-                <a16:creationId xmlns:a16="http://schemas.microsoft.com/office/drawing/2014/main" id="{C4905A01-8DC2-4ACE-8E7F-1F00D244C8DF}"/>
+                <a16:creationId xmlns:a16="http://schemas.microsoft.com/office/drawing/2014/main" xmlns="" id="{C4905A01-8DC2-4ACE-8E7F-1F00D244C8DF}"/>
               </a:ext>
             </a:extLst>
           </p:cNvPr>
@@ -840,7 +845,7 @@
           <p:cNvPr id="4" name="Espaço Reservado para Data 3">
             <a:extLst>
               <a:ext uri="{FF2B5EF4-FFF2-40B4-BE49-F238E27FC236}">
-                <a16:creationId xmlns:a16="http://schemas.microsoft.com/office/drawing/2014/main" id="{13623BD5-A455-416E-8CC4-F9D219EDB742}"/>
+                <a16:creationId xmlns:a16="http://schemas.microsoft.com/office/drawing/2014/main" xmlns="" id="{13623BD5-A455-416E-8CC4-F9D219EDB742}"/>
               </a:ext>
             </a:extLst>
           </p:cNvPr>
@@ -858,7 +863,7 @@
           <a:p>
             <a:fld id="{C55D88D1-7F48-4BE3-A3D3-4F639BB2942B}" type="datetimeFigureOut">
               <a:rPr lang="pt-BR" smtClean="0"/>
-              <a:t>10/04/2020</a:t>
+              <a:t>15/04/2020</a:t>
             </a:fld>
             <a:endParaRPr lang="pt-BR"/>
           </a:p>
@@ -869,7 +874,7 @@
           <p:cNvPr id="5" name="Espaço Reservado para Rodapé 4">
             <a:extLst>
               <a:ext uri="{FF2B5EF4-FFF2-40B4-BE49-F238E27FC236}">
-                <a16:creationId xmlns:a16="http://schemas.microsoft.com/office/drawing/2014/main" id="{6A15710A-CC07-4CF3-8F45-24E5E9AFBB4A}"/>
+                <a16:creationId xmlns:a16="http://schemas.microsoft.com/office/drawing/2014/main" xmlns="" id="{6A15710A-CC07-4CF3-8F45-24E5E9AFBB4A}"/>
               </a:ext>
             </a:extLst>
           </p:cNvPr>
@@ -894,7 +899,7 @@
           <p:cNvPr id="6" name="Espaço Reservado para Número de Slide 5">
             <a:extLst>
               <a:ext uri="{FF2B5EF4-FFF2-40B4-BE49-F238E27FC236}">
-                <a16:creationId xmlns:a16="http://schemas.microsoft.com/office/drawing/2014/main" id="{CD5DD6B1-D97C-4234-87FA-9656D217174B}"/>
+                <a16:creationId xmlns:a16="http://schemas.microsoft.com/office/drawing/2014/main" xmlns="" id="{CD5DD6B1-D97C-4234-87FA-9656D217174B}"/>
               </a:ext>
             </a:extLst>
           </p:cNvPr>
@@ -953,7 +958,7 @@
           <p:cNvPr id="2" name="Título 1">
             <a:extLst>
               <a:ext uri="{FF2B5EF4-FFF2-40B4-BE49-F238E27FC236}">
-                <a16:creationId xmlns:a16="http://schemas.microsoft.com/office/drawing/2014/main" id="{C5609B64-BF40-4D50-A2DB-F0FDB2090E17}"/>
+                <a16:creationId xmlns:a16="http://schemas.microsoft.com/office/drawing/2014/main" xmlns="" id="{C5609B64-BF40-4D50-A2DB-F0FDB2090E17}"/>
               </a:ext>
             </a:extLst>
           </p:cNvPr>
@@ -990,7 +995,7 @@
           <p:cNvPr id="3" name="Espaço Reservado para Texto 2">
             <a:extLst>
               <a:ext uri="{FF2B5EF4-FFF2-40B4-BE49-F238E27FC236}">
-                <a16:creationId xmlns:a16="http://schemas.microsoft.com/office/drawing/2014/main" id="{10EF6806-B254-47C9-AE2E-9070EF85147B}"/>
+                <a16:creationId xmlns:a16="http://schemas.microsoft.com/office/drawing/2014/main" xmlns="" id="{10EF6806-B254-47C9-AE2E-9070EF85147B}"/>
               </a:ext>
             </a:extLst>
           </p:cNvPr>
@@ -1115,7 +1120,7 @@
           <p:cNvPr id="4" name="Espaço Reservado para Data 3">
             <a:extLst>
               <a:ext uri="{FF2B5EF4-FFF2-40B4-BE49-F238E27FC236}">
-                <a16:creationId xmlns:a16="http://schemas.microsoft.com/office/drawing/2014/main" id="{202DAA8B-E70A-4CFD-BD94-8A4E4F00D791}"/>
+                <a16:creationId xmlns:a16="http://schemas.microsoft.com/office/drawing/2014/main" xmlns="" id="{202DAA8B-E70A-4CFD-BD94-8A4E4F00D791}"/>
               </a:ext>
             </a:extLst>
           </p:cNvPr>
@@ -1133,7 +1138,7 @@
           <a:p>
             <a:fld id="{C55D88D1-7F48-4BE3-A3D3-4F639BB2942B}" type="datetimeFigureOut">
               <a:rPr lang="pt-BR" smtClean="0"/>
-              <a:t>10/04/2020</a:t>
+              <a:t>15/04/2020</a:t>
             </a:fld>
             <a:endParaRPr lang="pt-BR"/>
           </a:p>
@@ -1144,7 +1149,7 @@
           <p:cNvPr id="5" name="Espaço Reservado para Rodapé 4">
             <a:extLst>
               <a:ext uri="{FF2B5EF4-FFF2-40B4-BE49-F238E27FC236}">
-                <a16:creationId xmlns:a16="http://schemas.microsoft.com/office/drawing/2014/main" id="{ACFF103E-6255-415A-810F-399F32182FCA}"/>
+                <a16:creationId xmlns:a16="http://schemas.microsoft.com/office/drawing/2014/main" xmlns="" id="{ACFF103E-6255-415A-810F-399F32182FCA}"/>
               </a:ext>
             </a:extLst>
           </p:cNvPr>
@@ -1169,7 +1174,7 @@
           <p:cNvPr id="6" name="Espaço Reservado para Número de Slide 5">
             <a:extLst>
               <a:ext uri="{FF2B5EF4-FFF2-40B4-BE49-F238E27FC236}">
-                <a16:creationId xmlns:a16="http://schemas.microsoft.com/office/drawing/2014/main" id="{D9F04F3F-9F32-4675-8A6C-243126725705}"/>
+                <a16:creationId xmlns:a16="http://schemas.microsoft.com/office/drawing/2014/main" xmlns="" id="{D9F04F3F-9F32-4675-8A6C-243126725705}"/>
               </a:ext>
             </a:extLst>
           </p:cNvPr>
@@ -1228,7 +1233,7 @@
           <p:cNvPr id="2" name="Título 1">
             <a:extLst>
               <a:ext uri="{FF2B5EF4-FFF2-40B4-BE49-F238E27FC236}">
-                <a16:creationId xmlns:a16="http://schemas.microsoft.com/office/drawing/2014/main" id="{B3274CAD-6857-4C73-A37F-A4E71ED195D7}"/>
+                <a16:creationId xmlns:a16="http://schemas.microsoft.com/office/drawing/2014/main" xmlns="" id="{B3274CAD-6857-4C73-A37F-A4E71ED195D7}"/>
               </a:ext>
             </a:extLst>
           </p:cNvPr>
@@ -1256,7 +1261,7 @@
           <p:cNvPr id="3" name="Espaço Reservado para Conteúdo 2">
             <a:extLst>
               <a:ext uri="{FF2B5EF4-FFF2-40B4-BE49-F238E27FC236}">
-                <a16:creationId xmlns:a16="http://schemas.microsoft.com/office/drawing/2014/main" id="{ED1D766E-57DE-43C6-B0FB-F096C2885A79}"/>
+                <a16:creationId xmlns:a16="http://schemas.microsoft.com/office/drawing/2014/main" xmlns="" id="{ED1D766E-57DE-43C6-B0FB-F096C2885A79}"/>
               </a:ext>
             </a:extLst>
           </p:cNvPr>
@@ -1318,7 +1323,7 @@
           <p:cNvPr id="4" name="Espaço Reservado para Conteúdo 3">
             <a:extLst>
               <a:ext uri="{FF2B5EF4-FFF2-40B4-BE49-F238E27FC236}">
-                <a16:creationId xmlns:a16="http://schemas.microsoft.com/office/drawing/2014/main" id="{FAEC1041-3197-4534-A147-3F6C51518F15}"/>
+                <a16:creationId xmlns:a16="http://schemas.microsoft.com/office/drawing/2014/main" xmlns="" id="{FAEC1041-3197-4534-A147-3F6C51518F15}"/>
               </a:ext>
             </a:extLst>
           </p:cNvPr>
@@ -1380,7 +1385,7 @@
           <p:cNvPr id="5" name="Espaço Reservado para Data 4">
             <a:extLst>
               <a:ext uri="{FF2B5EF4-FFF2-40B4-BE49-F238E27FC236}">
-                <a16:creationId xmlns:a16="http://schemas.microsoft.com/office/drawing/2014/main" id="{A0C6137B-BDA3-4BB4-92B1-B2ECB91121E1}"/>
+                <a16:creationId xmlns:a16="http://schemas.microsoft.com/office/drawing/2014/main" xmlns="" id="{A0C6137B-BDA3-4BB4-92B1-B2ECB91121E1}"/>
               </a:ext>
             </a:extLst>
           </p:cNvPr>
@@ -1398,7 +1403,7 @@
           <a:p>
             <a:fld id="{C55D88D1-7F48-4BE3-A3D3-4F639BB2942B}" type="datetimeFigureOut">
               <a:rPr lang="pt-BR" smtClean="0"/>
-              <a:t>10/04/2020</a:t>
+              <a:t>15/04/2020</a:t>
             </a:fld>
             <a:endParaRPr lang="pt-BR"/>
           </a:p>
@@ -1409,7 +1414,7 @@
           <p:cNvPr id="6" name="Espaço Reservado para Rodapé 5">
             <a:extLst>
               <a:ext uri="{FF2B5EF4-FFF2-40B4-BE49-F238E27FC236}">
-                <a16:creationId xmlns:a16="http://schemas.microsoft.com/office/drawing/2014/main" id="{377FC31C-8E85-4E9D-92FD-B88755DBECBC}"/>
+                <a16:creationId xmlns:a16="http://schemas.microsoft.com/office/drawing/2014/main" xmlns="" id="{377FC31C-8E85-4E9D-92FD-B88755DBECBC}"/>
               </a:ext>
             </a:extLst>
           </p:cNvPr>
@@ -1434,7 +1439,7 @@
           <p:cNvPr id="7" name="Espaço Reservado para Número de Slide 6">
             <a:extLst>
               <a:ext uri="{FF2B5EF4-FFF2-40B4-BE49-F238E27FC236}">
-                <a16:creationId xmlns:a16="http://schemas.microsoft.com/office/drawing/2014/main" id="{D36B9930-5F15-41EF-BFDE-046057C021A2}"/>
+                <a16:creationId xmlns:a16="http://schemas.microsoft.com/office/drawing/2014/main" xmlns="" id="{D36B9930-5F15-41EF-BFDE-046057C021A2}"/>
               </a:ext>
             </a:extLst>
           </p:cNvPr>
@@ -1493,7 +1498,7 @@
           <p:cNvPr id="2" name="Título 1">
             <a:extLst>
               <a:ext uri="{FF2B5EF4-FFF2-40B4-BE49-F238E27FC236}">
-                <a16:creationId xmlns:a16="http://schemas.microsoft.com/office/drawing/2014/main" id="{0B89C264-F595-4AB3-AF8B-5732A8D649DB}"/>
+                <a16:creationId xmlns:a16="http://schemas.microsoft.com/office/drawing/2014/main" xmlns="" id="{0B89C264-F595-4AB3-AF8B-5732A8D649DB}"/>
               </a:ext>
             </a:extLst>
           </p:cNvPr>
@@ -1526,7 +1531,7 @@
           <p:cNvPr id="3" name="Espaço Reservado para Texto 2">
             <a:extLst>
               <a:ext uri="{FF2B5EF4-FFF2-40B4-BE49-F238E27FC236}">
-                <a16:creationId xmlns:a16="http://schemas.microsoft.com/office/drawing/2014/main" id="{6FAC91F6-6A1C-4890-A6CE-89F572EC1437}"/>
+                <a16:creationId xmlns:a16="http://schemas.microsoft.com/office/drawing/2014/main" xmlns="" id="{6FAC91F6-6A1C-4890-A6CE-89F572EC1437}"/>
               </a:ext>
             </a:extLst>
           </p:cNvPr>
@@ -1597,7 +1602,7 @@
           <p:cNvPr id="4" name="Espaço Reservado para Conteúdo 3">
             <a:extLst>
               <a:ext uri="{FF2B5EF4-FFF2-40B4-BE49-F238E27FC236}">
-                <a16:creationId xmlns:a16="http://schemas.microsoft.com/office/drawing/2014/main" id="{9A889920-9B55-4F80-B021-7FA88E38552B}"/>
+                <a16:creationId xmlns:a16="http://schemas.microsoft.com/office/drawing/2014/main" xmlns="" id="{9A889920-9B55-4F80-B021-7FA88E38552B}"/>
               </a:ext>
             </a:extLst>
           </p:cNvPr>
@@ -1659,7 +1664,7 @@
           <p:cNvPr id="5" name="Espaço Reservado para Texto 4">
             <a:extLst>
               <a:ext uri="{FF2B5EF4-FFF2-40B4-BE49-F238E27FC236}">
-                <a16:creationId xmlns:a16="http://schemas.microsoft.com/office/drawing/2014/main" id="{2E1F86D9-9370-496F-99B6-CC82823CDBBC}"/>
+                <a16:creationId xmlns:a16="http://schemas.microsoft.com/office/drawing/2014/main" xmlns="" id="{2E1F86D9-9370-496F-99B6-CC82823CDBBC}"/>
               </a:ext>
             </a:extLst>
           </p:cNvPr>
@@ -1730,7 +1735,7 @@
           <p:cNvPr id="6" name="Espaço Reservado para Conteúdo 5">
             <a:extLst>
               <a:ext uri="{FF2B5EF4-FFF2-40B4-BE49-F238E27FC236}">
-                <a16:creationId xmlns:a16="http://schemas.microsoft.com/office/drawing/2014/main" id="{C61575FE-19B8-4D68-9DE2-32455A169152}"/>
+                <a16:creationId xmlns:a16="http://schemas.microsoft.com/office/drawing/2014/main" xmlns="" id="{C61575FE-19B8-4D68-9DE2-32455A169152}"/>
               </a:ext>
             </a:extLst>
           </p:cNvPr>
@@ -1792,7 +1797,7 @@
           <p:cNvPr id="7" name="Espaço Reservado para Data 6">
             <a:extLst>
               <a:ext uri="{FF2B5EF4-FFF2-40B4-BE49-F238E27FC236}">
-                <a16:creationId xmlns:a16="http://schemas.microsoft.com/office/drawing/2014/main" id="{973B5D21-4FCB-496F-BB98-0D6A2441A913}"/>
+                <a16:creationId xmlns:a16="http://schemas.microsoft.com/office/drawing/2014/main" xmlns="" id="{973B5D21-4FCB-496F-BB98-0D6A2441A913}"/>
               </a:ext>
             </a:extLst>
           </p:cNvPr>
@@ -1810,7 +1815,7 @@
           <a:p>
             <a:fld id="{C55D88D1-7F48-4BE3-A3D3-4F639BB2942B}" type="datetimeFigureOut">
               <a:rPr lang="pt-BR" smtClean="0"/>
-              <a:t>10/04/2020</a:t>
+              <a:t>15/04/2020</a:t>
             </a:fld>
             <a:endParaRPr lang="pt-BR"/>
           </a:p>
@@ -1821,7 +1826,7 @@
           <p:cNvPr id="8" name="Espaço Reservado para Rodapé 7">
             <a:extLst>
               <a:ext uri="{FF2B5EF4-FFF2-40B4-BE49-F238E27FC236}">
-                <a16:creationId xmlns:a16="http://schemas.microsoft.com/office/drawing/2014/main" id="{61640726-E6E4-4FAB-A98A-05E5FC67AC9E}"/>
+                <a16:creationId xmlns:a16="http://schemas.microsoft.com/office/drawing/2014/main" xmlns="" id="{61640726-E6E4-4FAB-A98A-05E5FC67AC9E}"/>
               </a:ext>
             </a:extLst>
           </p:cNvPr>
@@ -1846,7 +1851,7 @@
           <p:cNvPr id="9" name="Espaço Reservado para Número de Slide 8">
             <a:extLst>
               <a:ext uri="{FF2B5EF4-FFF2-40B4-BE49-F238E27FC236}">
-                <a16:creationId xmlns:a16="http://schemas.microsoft.com/office/drawing/2014/main" id="{3716D9B4-CD75-4DB6-A59D-45E459D4B2DC}"/>
+                <a16:creationId xmlns:a16="http://schemas.microsoft.com/office/drawing/2014/main" xmlns="" id="{3716D9B4-CD75-4DB6-A59D-45E459D4B2DC}"/>
               </a:ext>
             </a:extLst>
           </p:cNvPr>
@@ -1905,7 +1910,7 @@
           <p:cNvPr id="2" name="Título 1">
             <a:extLst>
               <a:ext uri="{FF2B5EF4-FFF2-40B4-BE49-F238E27FC236}">
-                <a16:creationId xmlns:a16="http://schemas.microsoft.com/office/drawing/2014/main" id="{1190758A-D923-4F15-A102-93858571DDF5}"/>
+                <a16:creationId xmlns:a16="http://schemas.microsoft.com/office/drawing/2014/main" xmlns="" id="{1190758A-D923-4F15-A102-93858571DDF5}"/>
               </a:ext>
             </a:extLst>
           </p:cNvPr>
@@ -1933,7 +1938,7 @@
           <p:cNvPr id="3" name="Espaço Reservado para Data 2">
             <a:extLst>
               <a:ext uri="{FF2B5EF4-FFF2-40B4-BE49-F238E27FC236}">
-                <a16:creationId xmlns:a16="http://schemas.microsoft.com/office/drawing/2014/main" id="{8D944B41-9E58-4856-A04E-51F2D4DC6B5C}"/>
+                <a16:creationId xmlns:a16="http://schemas.microsoft.com/office/drawing/2014/main" xmlns="" id="{8D944B41-9E58-4856-A04E-51F2D4DC6B5C}"/>
               </a:ext>
             </a:extLst>
           </p:cNvPr>
@@ -1951,7 +1956,7 @@
           <a:p>
             <a:fld id="{C55D88D1-7F48-4BE3-A3D3-4F639BB2942B}" type="datetimeFigureOut">
               <a:rPr lang="pt-BR" smtClean="0"/>
-              <a:t>10/04/2020</a:t>
+              <a:t>15/04/2020</a:t>
             </a:fld>
             <a:endParaRPr lang="pt-BR"/>
           </a:p>
@@ -1962,7 +1967,7 @@
           <p:cNvPr id="4" name="Espaço Reservado para Rodapé 3">
             <a:extLst>
               <a:ext uri="{FF2B5EF4-FFF2-40B4-BE49-F238E27FC236}">
-                <a16:creationId xmlns:a16="http://schemas.microsoft.com/office/drawing/2014/main" id="{31F38BD4-72D7-4199-8DEB-E0FA0754F0CF}"/>
+                <a16:creationId xmlns:a16="http://schemas.microsoft.com/office/drawing/2014/main" xmlns="" id="{31F38BD4-72D7-4199-8DEB-E0FA0754F0CF}"/>
               </a:ext>
             </a:extLst>
           </p:cNvPr>
@@ -1987,7 +1992,7 @@
           <p:cNvPr id="5" name="Espaço Reservado para Número de Slide 4">
             <a:extLst>
               <a:ext uri="{FF2B5EF4-FFF2-40B4-BE49-F238E27FC236}">
-                <a16:creationId xmlns:a16="http://schemas.microsoft.com/office/drawing/2014/main" id="{F39268AB-27EB-43FE-B5CE-D21F0F23D163}"/>
+                <a16:creationId xmlns:a16="http://schemas.microsoft.com/office/drawing/2014/main" xmlns="" id="{F39268AB-27EB-43FE-B5CE-D21F0F23D163}"/>
               </a:ext>
             </a:extLst>
           </p:cNvPr>
@@ -2046,7 +2051,7 @@
           <p:cNvPr id="2" name="Espaço Reservado para Data 1">
             <a:extLst>
               <a:ext uri="{FF2B5EF4-FFF2-40B4-BE49-F238E27FC236}">
-                <a16:creationId xmlns:a16="http://schemas.microsoft.com/office/drawing/2014/main" id="{333B885B-45FB-458B-A707-809390208959}"/>
+                <a16:creationId xmlns:a16="http://schemas.microsoft.com/office/drawing/2014/main" xmlns="" id="{333B885B-45FB-458B-A707-809390208959}"/>
               </a:ext>
             </a:extLst>
           </p:cNvPr>
@@ -2064,7 +2069,7 @@
           <a:p>
             <a:fld id="{C55D88D1-7F48-4BE3-A3D3-4F639BB2942B}" type="datetimeFigureOut">
               <a:rPr lang="pt-BR" smtClean="0"/>
-              <a:t>10/04/2020</a:t>
+              <a:t>15/04/2020</a:t>
             </a:fld>
             <a:endParaRPr lang="pt-BR"/>
           </a:p>
@@ -2075,7 +2080,7 @@
           <p:cNvPr id="3" name="Espaço Reservado para Rodapé 2">
             <a:extLst>
               <a:ext uri="{FF2B5EF4-FFF2-40B4-BE49-F238E27FC236}">
-                <a16:creationId xmlns:a16="http://schemas.microsoft.com/office/drawing/2014/main" id="{DC556F93-3CBB-4CCB-86B4-52BFD441D29C}"/>
+                <a16:creationId xmlns:a16="http://schemas.microsoft.com/office/drawing/2014/main" xmlns="" id="{DC556F93-3CBB-4CCB-86B4-52BFD441D29C}"/>
               </a:ext>
             </a:extLst>
           </p:cNvPr>
@@ -2100,7 +2105,7 @@
           <p:cNvPr id="4" name="Espaço Reservado para Número de Slide 3">
             <a:extLst>
               <a:ext uri="{FF2B5EF4-FFF2-40B4-BE49-F238E27FC236}">
-                <a16:creationId xmlns:a16="http://schemas.microsoft.com/office/drawing/2014/main" id="{58DB6890-3CAF-497A-8E01-054F746190C8}"/>
+                <a16:creationId xmlns:a16="http://schemas.microsoft.com/office/drawing/2014/main" xmlns="" id="{58DB6890-3CAF-497A-8E01-054F746190C8}"/>
               </a:ext>
             </a:extLst>
           </p:cNvPr>
@@ -2159,7 +2164,7 @@
           <p:cNvPr id="2" name="Título 1">
             <a:extLst>
               <a:ext uri="{FF2B5EF4-FFF2-40B4-BE49-F238E27FC236}">
-                <a16:creationId xmlns:a16="http://schemas.microsoft.com/office/drawing/2014/main" id="{DBC6C946-4DFD-45DC-89B9-AF76121D878A}"/>
+                <a16:creationId xmlns:a16="http://schemas.microsoft.com/office/drawing/2014/main" xmlns="" id="{DBC6C946-4DFD-45DC-89B9-AF76121D878A}"/>
               </a:ext>
             </a:extLst>
           </p:cNvPr>
@@ -2196,7 +2201,7 @@
           <p:cNvPr id="3" name="Espaço Reservado para Conteúdo 2">
             <a:extLst>
               <a:ext uri="{FF2B5EF4-FFF2-40B4-BE49-F238E27FC236}">
-                <a16:creationId xmlns:a16="http://schemas.microsoft.com/office/drawing/2014/main" id="{47E009F2-E9AE-44FA-9179-894F870AD426}"/>
+                <a16:creationId xmlns:a16="http://schemas.microsoft.com/office/drawing/2014/main" xmlns="" id="{47E009F2-E9AE-44FA-9179-894F870AD426}"/>
               </a:ext>
             </a:extLst>
           </p:cNvPr>
@@ -2286,7 +2291,7 @@
           <p:cNvPr id="4" name="Espaço Reservado para Texto 3">
             <a:extLst>
               <a:ext uri="{FF2B5EF4-FFF2-40B4-BE49-F238E27FC236}">
-                <a16:creationId xmlns:a16="http://schemas.microsoft.com/office/drawing/2014/main" id="{F5901B2A-B1E9-471B-B35C-FBACD2FC8A06}"/>
+                <a16:creationId xmlns:a16="http://schemas.microsoft.com/office/drawing/2014/main" xmlns="" id="{F5901B2A-B1E9-471B-B35C-FBACD2FC8A06}"/>
               </a:ext>
             </a:extLst>
           </p:cNvPr>
@@ -2357,7 +2362,7 @@
           <p:cNvPr id="5" name="Espaço Reservado para Data 4">
             <a:extLst>
               <a:ext uri="{FF2B5EF4-FFF2-40B4-BE49-F238E27FC236}">
-                <a16:creationId xmlns:a16="http://schemas.microsoft.com/office/drawing/2014/main" id="{72165B5F-D5E8-4DFC-ABFA-D4A3A86BDB39}"/>
+                <a16:creationId xmlns:a16="http://schemas.microsoft.com/office/drawing/2014/main" xmlns="" id="{72165B5F-D5E8-4DFC-ABFA-D4A3A86BDB39}"/>
               </a:ext>
             </a:extLst>
           </p:cNvPr>
@@ -2375,7 +2380,7 @@
           <a:p>
             <a:fld id="{C55D88D1-7F48-4BE3-A3D3-4F639BB2942B}" type="datetimeFigureOut">
               <a:rPr lang="pt-BR" smtClean="0"/>
-              <a:t>10/04/2020</a:t>
+              <a:t>15/04/2020</a:t>
             </a:fld>
             <a:endParaRPr lang="pt-BR"/>
           </a:p>
@@ -2386,7 +2391,7 @@
           <p:cNvPr id="6" name="Espaço Reservado para Rodapé 5">
             <a:extLst>
               <a:ext uri="{FF2B5EF4-FFF2-40B4-BE49-F238E27FC236}">
-                <a16:creationId xmlns:a16="http://schemas.microsoft.com/office/drawing/2014/main" id="{13D83C7E-DD50-437A-AFBD-0E78E003BBD8}"/>
+                <a16:creationId xmlns:a16="http://schemas.microsoft.com/office/drawing/2014/main" xmlns="" id="{13D83C7E-DD50-437A-AFBD-0E78E003BBD8}"/>
               </a:ext>
             </a:extLst>
           </p:cNvPr>
@@ -2411,7 +2416,7 @@
           <p:cNvPr id="7" name="Espaço Reservado para Número de Slide 6">
             <a:extLst>
               <a:ext uri="{FF2B5EF4-FFF2-40B4-BE49-F238E27FC236}">
-                <a16:creationId xmlns:a16="http://schemas.microsoft.com/office/drawing/2014/main" id="{5D10F792-7960-4B22-AE55-68AA7EC4D93B}"/>
+                <a16:creationId xmlns:a16="http://schemas.microsoft.com/office/drawing/2014/main" xmlns="" id="{5D10F792-7960-4B22-AE55-68AA7EC4D93B}"/>
               </a:ext>
             </a:extLst>
           </p:cNvPr>
@@ -2470,7 +2475,7 @@
           <p:cNvPr id="2" name="Título 1">
             <a:extLst>
               <a:ext uri="{FF2B5EF4-FFF2-40B4-BE49-F238E27FC236}">
-                <a16:creationId xmlns:a16="http://schemas.microsoft.com/office/drawing/2014/main" id="{20E42BFD-AD50-42E6-8D2A-8BAD99DAAC69}"/>
+                <a16:creationId xmlns:a16="http://schemas.microsoft.com/office/drawing/2014/main" xmlns="" id="{20E42BFD-AD50-42E6-8D2A-8BAD99DAAC69}"/>
               </a:ext>
             </a:extLst>
           </p:cNvPr>
@@ -2507,7 +2512,7 @@
           <p:cNvPr id="3" name="Espaço Reservado para Imagem 2">
             <a:extLst>
               <a:ext uri="{FF2B5EF4-FFF2-40B4-BE49-F238E27FC236}">
-                <a16:creationId xmlns:a16="http://schemas.microsoft.com/office/drawing/2014/main" id="{04895170-30BA-4F66-A1F2-1F9BFBA3A472}"/>
+                <a16:creationId xmlns:a16="http://schemas.microsoft.com/office/drawing/2014/main" xmlns="" id="{04895170-30BA-4F66-A1F2-1F9BFBA3A472}"/>
               </a:ext>
             </a:extLst>
           </p:cNvPr>
@@ -2574,7 +2579,7 @@
           <p:cNvPr id="4" name="Espaço Reservado para Texto 3">
             <a:extLst>
               <a:ext uri="{FF2B5EF4-FFF2-40B4-BE49-F238E27FC236}">
-                <a16:creationId xmlns:a16="http://schemas.microsoft.com/office/drawing/2014/main" id="{D6178F50-306B-4494-A0EA-38832F39B2EC}"/>
+                <a16:creationId xmlns:a16="http://schemas.microsoft.com/office/drawing/2014/main" xmlns="" id="{D6178F50-306B-4494-A0EA-38832F39B2EC}"/>
               </a:ext>
             </a:extLst>
           </p:cNvPr>
@@ -2645,7 +2650,7 @@
           <p:cNvPr id="5" name="Espaço Reservado para Data 4">
             <a:extLst>
               <a:ext uri="{FF2B5EF4-FFF2-40B4-BE49-F238E27FC236}">
-                <a16:creationId xmlns:a16="http://schemas.microsoft.com/office/drawing/2014/main" id="{4EEBB831-1351-4C68-B8BD-EC8DA7A27AB0}"/>
+                <a16:creationId xmlns:a16="http://schemas.microsoft.com/office/drawing/2014/main" xmlns="" id="{4EEBB831-1351-4C68-B8BD-EC8DA7A27AB0}"/>
               </a:ext>
             </a:extLst>
           </p:cNvPr>
@@ -2663,7 +2668,7 @@
           <a:p>
             <a:fld id="{C55D88D1-7F48-4BE3-A3D3-4F639BB2942B}" type="datetimeFigureOut">
               <a:rPr lang="pt-BR" smtClean="0"/>
-              <a:t>10/04/2020</a:t>
+              <a:t>15/04/2020</a:t>
             </a:fld>
             <a:endParaRPr lang="pt-BR"/>
           </a:p>
@@ -2674,7 +2679,7 @@
           <p:cNvPr id="6" name="Espaço Reservado para Rodapé 5">
             <a:extLst>
               <a:ext uri="{FF2B5EF4-FFF2-40B4-BE49-F238E27FC236}">
-                <a16:creationId xmlns:a16="http://schemas.microsoft.com/office/drawing/2014/main" id="{6D6C3982-9B52-4A57-AFA4-A6DFE0A7D27A}"/>
+                <a16:creationId xmlns:a16="http://schemas.microsoft.com/office/drawing/2014/main" xmlns="" id="{6D6C3982-9B52-4A57-AFA4-A6DFE0A7D27A}"/>
               </a:ext>
             </a:extLst>
           </p:cNvPr>
@@ -2699,7 +2704,7 @@
           <p:cNvPr id="7" name="Espaço Reservado para Número de Slide 6">
             <a:extLst>
               <a:ext uri="{FF2B5EF4-FFF2-40B4-BE49-F238E27FC236}">
-                <a16:creationId xmlns:a16="http://schemas.microsoft.com/office/drawing/2014/main" id="{1AD707E5-2FD8-483C-A875-23C6BD6059F9}"/>
+                <a16:creationId xmlns:a16="http://schemas.microsoft.com/office/drawing/2014/main" xmlns="" id="{1AD707E5-2FD8-483C-A875-23C6BD6059F9}"/>
               </a:ext>
             </a:extLst>
           </p:cNvPr>
@@ -2763,7 +2768,7 @@
           <p:cNvPr id="2" name="Espaço Reservado para Título 1">
             <a:extLst>
               <a:ext uri="{FF2B5EF4-FFF2-40B4-BE49-F238E27FC236}">
-                <a16:creationId xmlns:a16="http://schemas.microsoft.com/office/drawing/2014/main" id="{7AEE2D41-2B91-4D0A-A28B-5788F8F6ED35}"/>
+                <a16:creationId xmlns:a16="http://schemas.microsoft.com/office/drawing/2014/main" xmlns="" id="{7AEE2D41-2B91-4D0A-A28B-5788F8F6ED35}"/>
               </a:ext>
             </a:extLst>
           </p:cNvPr>
@@ -2801,7 +2806,7 @@
           <p:cNvPr id="3" name="Espaço Reservado para Texto 2">
             <a:extLst>
               <a:ext uri="{FF2B5EF4-FFF2-40B4-BE49-F238E27FC236}">
-                <a16:creationId xmlns:a16="http://schemas.microsoft.com/office/drawing/2014/main" id="{36AA72E0-BCC5-47EF-808B-D8A42AAF9A61}"/>
+                <a16:creationId xmlns:a16="http://schemas.microsoft.com/office/drawing/2014/main" xmlns="" id="{36AA72E0-BCC5-47EF-808B-D8A42AAF9A61}"/>
               </a:ext>
             </a:extLst>
           </p:cNvPr>
@@ -2868,7 +2873,7 @@
           <p:cNvPr id="4" name="Espaço Reservado para Data 3">
             <a:extLst>
               <a:ext uri="{FF2B5EF4-FFF2-40B4-BE49-F238E27FC236}">
-                <a16:creationId xmlns:a16="http://schemas.microsoft.com/office/drawing/2014/main" id="{B5CD1884-BC1B-408A-9F86-DFCEDF54654F}"/>
+                <a16:creationId xmlns:a16="http://schemas.microsoft.com/office/drawing/2014/main" xmlns="" id="{B5CD1884-BC1B-408A-9F86-DFCEDF54654F}"/>
               </a:ext>
             </a:extLst>
           </p:cNvPr>
@@ -2904,7 +2909,7 @@
           <a:p>
             <a:fld id="{C55D88D1-7F48-4BE3-A3D3-4F639BB2942B}" type="datetimeFigureOut">
               <a:rPr lang="pt-BR" smtClean="0"/>
-              <a:t>10/04/2020</a:t>
+              <a:t>15/04/2020</a:t>
             </a:fld>
             <a:endParaRPr lang="pt-BR"/>
           </a:p>
@@ -2915,7 +2920,7 @@
           <p:cNvPr id="5" name="Espaço Reservado para Rodapé 4">
             <a:extLst>
               <a:ext uri="{FF2B5EF4-FFF2-40B4-BE49-F238E27FC236}">
-                <a16:creationId xmlns:a16="http://schemas.microsoft.com/office/drawing/2014/main" id="{D0762338-4F10-4D0C-AEA4-4732CC956102}"/>
+                <a16:creationId xmlns:a16="http://schemas.microsoft.com/office/drawing/2014/main" xmlns="" id="{D0762338-4F10-4D0C-AEA4-4732CC956102}"/>
               </a:ext>
             </a:extLst>
           </p:cNvPr>
@@ -2958,7 +2963,7 @@
           <p:cNvPr id="6" name="Espaço Reservado para Número de Slide 5">
             <a:extLst>
               <a:ext uri="{FF2B5EF4-FFF2-40B4-BE49-F238E27FC236}">
-                <a16:creationId xmlns:a16="http://schemas.microsoft.com/office/drawing/2014/main" id="{92BE09F1-05C6-4629-9221-A7BDB295714D}"/>
+                <a16:creationId xmlns:a16="http://schemas.microsoft.com/office/drawing/2014/main" xmlns="" id="{92BE09F1-05C6-4629-9221-A7BDB295714D}"/>
               </a:ext>
             </a:extLst>
           </p:cNvPr>
@@ -3323,27 +3328,19 @@
       </p:grpSpPr>
       <p:sp>
         <p:nvSpPr>
-          <p:cNvPr id="4" name="Retângulo: Cantos Arredondados 3">
-            <a:extLst>
-              <a:ext uri="{FF2B5EF4-FFF2-40B4-BE49-F238E27FC236}">
-                <a16:creationId xmlns:a16="http://schemas.microsoft.com/office/drawing/2014/main" id="{876995CB-FE7F-4048-B678-503E954113B3}"/>
-              </a:ext>
-            </a:extLst>
-          </p:cNvPr>
+          <p:cNvPr id="5" name="Nuvem 4"/>
           <p:cNvSpPr/>
           <p:nvPr/>
         </p:nvSpPr>
         <p:spPr>
           <a:xfrm>
-            <a:off x="516835" y="424068"/>
-            <a:ext cx="4731026" cy="4333461"/>
-          </a:xfrm>
-          <a:prstGeom prst="roundRect">
+            <a:off x="2622176" y="201708"/>
+            <a:ext cx="6777318" cy="2837328"/>
+          </a:xfrm>
+          <a:prstGeom prst="cloud">
             <a:avLst/>
           </a:prstGeom>
-          <a:solidFill>
-            <a:schemeClr val="bg1"/>
-          </a:solidFill>
+          <a:noFill/>
         </p:spPr>
         <p:style>
           <a:lnRef idx="2">
@@ -3370,332 +3367,12 @@
           </a:p>
         </p:txBody>
       </p:sp>
-      <p:sp>
-        <p:nvSpPr>
-          <p:cNvPr id="12" name="Retângulo: Cantos Arredondados 11">
-            <a:extLst>
-              <a:ext uri="{FF2B5EF4-FFF2-40B4-BE49-F238E27FC236}">
-                <a16:creationId xmlns:a16="http://schemas.microsoft.com/office/drawing/2014/main" id="{0EDE8046-1629-4CAC-8A5A-ABD8F3460EED}"/>
-              </a:ext>
-            </a:extLst>
-          </p:cNvPr>
-          <p:cNvSpPr/>
-          <p:nvPr/>
-        </p:nvSpPr>
-        <p:spPr>
-          <a:xfrm>
-            <a:off x="733449" y="645708"/>
-            <a:ext cx="4309003" cy="3677549"/>
-          </a:xfrm>
-          <a:prstGeom prst="roundRect">
-            <a:avLst/>
-          </a:prstGeom>
-          <a:solidFill>
-            <a:schemeClr val="bg1"/>
-          </a:solidFill>
-        </p:spPr>
-        <p:style>
-          <a:lnRef idx="2">
-            <a:schemeClr val="accent1">
-              <a:shade val="50000"/>
-            </a:schemeClr>
-          </a:lnRef>
-          <a:fillRef idx="1">
-            <a:schemeClr val="accent1"/>
-          </a:fillRef>
-          <a:effectRef idx="0">
-            <a:schemeClr val="accent1"/>
-          </a:effectRef>
-          <a:fontRef idx="minor">
-            <a:schemeClr val="lt1"/>
-          </a:fontRef>
-        </p:style>
-        <p:txBody>
-          <a:bodyPr rtlCol="0" anchor="ctr"/>
-          <a:lstStyle/>
-          <a:p>
-            <a:pPr algn="ctr"/>
-            <a:endParaRPr lang="pt-BR"/>
-          </a:p>
-        </p:txBody>
-      </p:sp>
-      <p:sp>
-        <p:nvSpPr>
-          <p:cNvPr id="10" name="CaixaDeTexto 9">
-            <a:extLst>
-              <a:ext uri="{FF2B5EF4-FFF2-40B4-BE49-F238E27FC236}">
-                <a16:creationId xmlns:a16="http://schemas.microsoft.com/office/drawing/2014/main" id="{F96BDD8F-A2AC-4429-AA7B-CB39086E8A4E}"/>
-              </a:ext>
-            </a:extLst>
-          </p:cNvPr>
-          <p:cNvSpPr txBox="1"/>
-          <p:nvPr/>
-        </p:nvSpPr>
-        <p:spPr>
-          <a:xfrm>
-            <a:off x="3313043" y="4323258"/>
-            <a:ext cx="1934818" cy="369332"/>
-          </a:xfrm>
-          <a:prstGeom prst="rect">
-            <a:avLst/>
-          </a:prstGeom>
-          <a:noFill/>
-        </p:spPr>
-        <p:txBody>
-          <a:bodyPr wrap="square" rtlCol="0">
-            <a:spAutoFit/>
-          </a:bodyPr>
-          <a:lstStyle/>
-          <a:p>
-            <a:r>
-              <a:rPr lang="pt-BR" dirty="0"/>
-              <a:t>Máquina física</a:t>
-            </a:r>
-          </a:p>
-        </p:txBody>
-      </p:sp>
       <p:pic>
         <p:nvPicPr>
-          <p:cNvPr id="11" name="Imagem 10">
-            <a:extLst>
-              <a:ext uri="{FF2B5EF4-FFF2-40B4-BE49-F238E27FC236}">
-                <a16:creationId xmlns:a16="http://schemas.microsoft.com/office/drawing/2014/main" id="{54484672-6964-4D0F-A8D1-B42BFA789A53}"/>
-              </a:ext>
-            </a:extLst>
-          </p:cNvPr>
-          <p:cNvPicPr>
-            <a:picLocks noChangeAspect="1"/>
-          </p:cNvPicPr>
-          <p:nvPr/>
-        </p:nvPicPr>
-        <p:blipFill>
-          <a:blip r:embed="rId2">
-            <a:extLst>
-              <a:ext uri="{28A0092B-C50C-407E-A947-70E740481C1C}">
-                <a14:useLocalDpi xmlns:a14="http://schemas.microsoft.com/office/drawing/2010/main" val="0"/>
-              </a:ext>
-            </a:extLst>
-          </a:blip>
-          <a:stretch>
-            <a:fillRect/>
-          </a:stretch>
-        </p:blipFill>
-        <p:spPr>
-          <a:xfrm>
-            <a:off x="1655640" y="717968"/>
-            <a:ext cx="507775" cy="507775"/>
-          </a:xfrm>
-          <a:prstGeom prst="rect">
-            <a:avLst/>
-          </a:prstGeom>
-        </p:spPr>
-      </p:pic>
-      <p:sp>
-        <p:nvSpPr>
-          <p:cNvPr id="13" name="Retângulo: Cantos Arredondados 12">
-            <a:extLst>
-              <a:ext uri="{FF2B5EF4-FFF2-40B4-BE49-F238E27FC236}">
-                <a16:creationId xmlns:a16="http://schemas.microsoft.com/office/drawing/2014/main" id="{7C57EE0C-7353-47A1-8338-77A61646C73C}"/>
-              </a:ext>
-            </a:extLst>
-          </p:cNvPr>
-          <p:cNvSpPr/>
-          <p:nvPr/>
-        </p:nvSpPr>
-        <p:spPr>
-          <a:xfrm>
-            <a:off x="3088854" y="1325558"/>
-            <a:ext cx="1732723" cy="1858257"/>
-          </a:xfrm>
-          <a:prstGeom prst="roundRect">
-            <a:avLst/>
-          </a:prstGeom>
-          <a:solidFill>
-            <a:schemeClr val="bg1"/>
-          </a:solidFill>
-        </p:spPr>
-        <p:style>
-          <a:lnRef idx="2">
-            <a:schemeClr val="accent1">
-              <a:shade val="50000"/>
-            </a:schemeClr>
-          </a:lnRef>
-          <a:fillRef idx="1">
-            <a:schemeClr val="accent1"/>
-          </a:fillRef>
-          <a:effectRef idx="0">
-            <a:schemeClr val="accent1"/>
-          </a:effectRef>
-          <a:fontRef idx="minor">
-            <a:schemeClr val="lt1"/>
-          </a:fontRef>
-        </p:style>
-        <p:txBody>
-          <a:bodyPr rtlCol="0" anchor="ctr"/>
-          <a:lstStyle/>
-          <a:p>
-            <a:pPr algn="ctr"/>
-            <a:endParaRPr lang="pt-BR"/>
-          </a:p>
-        </p:txBody>
-      </p:sp>
-      <p:sp>
-        <p:nvSpPr>
-          <p:cNvPr id="15" name="Retângulo: Cantos Arredondados 14">
-            <a:extLst>
-              <a:ext uri="{FF2B5EF4-FFF2-40B4-BE49-F238E27FC236}">
-                <a16:creationId xmlns:a16="http://schemas.microsoft.com/office/drawing/2014/main" id="{5D604496-0F3F-4175-86A6-FFF8D780B0C6}"/>
-              </a:ext>
-            </a:extLst>
-          </p:cNvPr>
-          <p:cNvSpPr/>
-          <p:nvPr/>
-        </p:nvSpPr>
-        <p:spPr>
-          <a:xfrm>
-            <a:off x="988501" y="1326080"/>
-            <a:ext cx="1751825" cy="1857736"/>
-          </a:xfrm>
-          <a:prstGeom prst="roundRect">
-            <a:avLst/>
-          </a:prstGeom>
-          <a:solidFill>
-            <a:schemeClr val="bg1"/>
-          </a:solidFill>
-        </p:spPr>
-        <p:style>
-          <a:lnRef idx="2">
-            <a:schemeClr val="accent1">
-              <a:shade val="50000"/>
-            </a:schemeClr>
-          </a:lnRef>
-          <a:fillRef idx="1">
-            <a:schemeClr val="accent1"/>
-          </a:fillRef>
-          <a:effectRef idx="0">
-            <a:schemeClr val="accent1"/>
-          </a:effectRef>
-          <a:fontRef idx="minor">
-            <a:schemeClr val="lt1"/>
-          </a:fontRef>
-        </p:style>
-        <p:txBody>
-          <a:bodyPr rtlCol="0" anchor="ctr"/>
-          <a:lstStyle/>
-          <a:p>
-            <a:pPr algn="ctr"/>
-            <a:endParaRPr lang="pt-BR"/>
-          </a:p>
-        </p:txBody>
-      </p:sp>
-      <p:sp>
-        <p:nvSpPr>
-          <p:cNvPr id="16" name="CaixaDeTexto 15">
-            <a:extLst>
-              <a:ext uri="{FF2B5EF4-FFF2-40B4-BE49-F238E27FC236}">
-                <a16:creationId xmlns:a16="http://schemas.microsoft.com/office/drawing/2014/main" id="{281A0AD4-8BB7-4050-83ED-CDEFD163D493}"/>
-              </a:ext>
-            </a:extLst>
-          </p:cNvPr>
-          <p:cNvSpPr txBox="1"/>
-          <p:nvPr/>
-        </p:nvSpPr>
-        <p:spPr>
-          <a:xfrm>
-            <a:off x="1353376" y="1347184"/>
-            <a:ext cx="810039" cy="369332"/>
-          </a:xfrm>
-          <a:prstGeom prst="rect">
-            <a:avLst/>
-          </a:prstGeom>
-          <a:noFill/>
-        </p:spPr>
-        <p:txBody>
-          <a:bodyPr wrap="square" rtlCol="0">
-            <a:spAutoFit/>
-          </a:bodyPr>
-          <a:lstStyle/>
-          <a:p>
-            <a:r>
-              <a:rPr lang="pt-BR" dirty="0">
-                <a:latin typeface="Constantia" panose="02030602050306030303" pitchFamily="18" charset="0"/>
-              </a:rPr>
-              <a:t>OSHI</a:t>
-            </a:r>
-          </a:p>
-        </p:txBody>
-      </p:sp>
-      <p:sp>
-        <p:nvSpPr>
-          <p:cNvPr id="17" name="CaixaDeTexto 16">
-            <a:extLst>
-              <a:ext uri="{FF2B5EF4-FFF2-40B4-BE49-F238E27FC236}">
-                <a16:creationId xmlns:a16="http://schemas.microsoft.com/office/drawing/2014/main" id="{C9C8E540-3787-44C9-8D3E-BE8F6D27A31C}"/>
-              </a:ext>
-            </a:extLst>
-          </p:cNvPr>
-          <p:cNvSpPr txBox="1"/>
-          <p:nvPr/>
-        </p:nvSpPr>
-        <p:spPr>
-          <a:xfrm>
-            <a:off x="991181" y="1716516"/>
-            <a:ext cx="1460664" cy="1200329"/>
-          </a:xfrm>
-          <a:prstGeom prst="rect">
-            <a:avLst/>
-          </a:prstGeom>
-          <a:noFill/>
-        </p:spPr>
-        <p:txBody>
-          <a:bodyPr wrap="square" rtlCol="0">
-            <a:spAutoFit/>
-          </a:bodyPr>
-          <a:lstStyle/>
-          <a:p>
-            <a:r>
-              <a:rPr lang="pt-BR" dirty="0"/>
-              <a:t>Monitorar:</a:t>
-            </a:r>
-          </a:p>
-          <a:p>
-            <a:pPr marL="285750" indent="-285750">
-              <a:buFontTx/>
-              <a:buChar char="-"/>
-            </a:pPr>
-            <a:r>
-              <a:rPr lang="pt-BR" dirty="0"/>
-              <a:t>CPU</a:t>
-            </a:r>
-          </a:p>
-          <a:p>
-            <a:pPr marL="285750" indent="-285750">
-              <a:buFontTx/>
-              <a:buChar char="-"/>
-            </a:pPr>
-            <a:r>
-              <a:rPr lang="pt-BR" dirty="0"/>
-              <a:t>Memória</a:t>
-            </a:r>
-          </a:p>
-          <a:p>
-            <a:pPr marL="285750" indent="-285750">
-              <a:buFontTx/>
-              <a:buChar char="-"/>
-            </a:pPr>
-            <a:r>
-              <a:rPr lang="pt-BR" dirty="0"/>
-              <a:t>Disco</a:t>
-            </a:r>
-          </a:p>
-        </p:txBody>
-      </p:sp>
-      <p:pic>
-        <p:nvPicPr>
-          <p:cNvPr id="1026" name="Picture 2" descr="Aprendendo a utilizar as funcionalidades do Jmeter - Danilo Jose ...">
-            <a:extLst>
-              <a:ext uri="{FF2B5EF4-FFF2-40B4-BE49-F238E27FC236}">
-                <a16:creationId xmlns:a16="http://schemas.microsoft.com/office/drawing/2014/main" id="{9A9337F9-39AF-4304-A13B-6556493E42F7}"/>
+          <p:cNvPr id="7" name="Picture 10" descr="Política de Ciclo de Vida da Microsoft">
+            <a:extLst>
+              <a:ext uri="{FF2B5EF4-FFF2-40B4-BE49-F238E27FC236}">
+                <a16:creationId xmlns:a16="http://schemas.microsoft.com/office/drawing/2014/main" xmlns="" id="{3109E731-D4F2-4C5D-8480-434E943CCCC9}"/>
               </a:ext>
             </a:extLst>
           </p:cNvPr>
@@ -3704,23 +3381,21 @@
           </p:cNvPicPr>
           <p:nvPr/>
         </p:nvPicPr>
-        <p:blipFill>
-          <a:blip r:embed="rId3">
+        <p:blipFill rotWithShape="1">
+          <a:blip r:embed="rId2">
             <a:extLst>
               <a:ext uri="{28A0092B-C50C-407E-A947-70E740481C1C}">
                 <a14:useLocalDpi xmlns:a14="http://schemas.microsoft.com/office/drawing/2010/main" val="0"/>
               </a:ext>
             </a:extLst>
           </a:blip>
-          <a:srcRect/>
-          <a:stretch>
-            <a:fillRect/>
-          </a:stretch>
+          <a:srcRect l="24892" t="18768" r="22029" b="20001"/>
+          <a:stretch/>
         </p:blipFill>
         <p:spPr bwMode="auto">
           <a:xfrm>
-            <a:off x="3283665" y="1463573"/>
-            <a:ext cx="1410492" cy="479188"/>
+            <a:off x="3446507" y="755038"/>
+            <a:ext cx="1149452" cy="745016"/>
           </a:xfrm>
           <a:prstGeom prst="rect">
             <a:avLst/>
@@ -3737,423 +3412,12 @@
           </a:extLst>
         </p:spPr>
       </p:pic>
-      <p:sp>
-        <p:nvSpPr>
-          <p:cNvPr id="19" name="CaixaDeTexto 18">
-            <a:extLst>
-              <a:ext uri="{FF2B5EF4-FFF2-40B4-BE49-F238E27FC236}">
-                <a16:creationId xmlns:a16="http://schemas.microsoft.com/office/drawing/2014/main" id="{9587070B-9DBE-4B3C-BC9D-FB271A00B71C}"/>
-              </a:ext>
-            </a:extLst>
-          </p:cNvPr>
-          <p:cNvSpPr txBox="1"/>
-          <p:nvPr/>
-        </p:nvSpPr>
-        <p:spPr>
-          <a:xfrm>
-            <a:off x="3283665" y="2138111"/>
-            <a:ext cx="1410492" cy="923330"/>
-          </a:xfrm>
-          <a:prstGeom prst="rect">
-            <a:avLst/>
-          </a:prstGeom>
-          <a:noFill/>
-        </p:spPr>
-        <p:txBody>
-          <a:bodyPr wrap="square" rtlCol="0">
-            <a:spAutoFit/>
-          </a:bodyPr>
-          <a:lstStyle/>
-          <a:p>
-            <a:r>
-              <a:rPr lang="pt-BR" dirty="0"/>
-              <a:t>Realizar testes em servidores</a:t>
-            </a:r>
-          </a:p>
-        </p:txBody>
-      </p:sp>
-      <p:sp>
-        <p:nvSpPr>
-          <p:cNvPr id="20" name="Nuvem 19">
-            <a:extLst>
-              <a:ext uri="{FF2B5EF4-FFF2-40B4-BE49-F238E27FC236}">
-                <a16:creationId xmlns:a16="http://schemas.microsoft.com/office/drawing/2014/main" id="{647CD33A-F7B4-4227-909C-88EF7E6375D8}"/>
-              </a:ext>
-            </a:extLst>
-          </p:cNvPr>
-          <p:cNvSpPr/>
-          <p:nvPr/>
-        </p:nvSpPr>
-        <p:spPr>
-          <a:xfrm>
-            <a:off x="5722635" y="538079"/>
-            <a:ext cx="6321287" cy="4757532"/>
-          </a:xfrm>
-          <a:prstGeom prst="cloud">
-            <a:avLst/>
-          </a:prstGeom>
-          <a:solidFill>
-            <a:schemeClr val="bg1"/>
-          </a:solidFill>
-        </p:spPr>
-        <p:style>
-          <a:lnRef idx="2">
-            <a:schemeClr val="accent1">
-              <a:shade val="50000"/>
-            </a:schemeClr>
-          </a:lnRef>
-          <a:fillRef idx="1">
-            <a:schemeClr val="accent1"/>
-          </a:fillRef>
-          <a:effectRef idx="0">
-            <a:schemeClr val="accent1"/>
-          </a:effectRef>
-          <a:fontRef idx="minor">
-            <a:schemeClr val="lt1"/>
-          </a:fontRef>
-        </p:style>
-        <p:txBody>
-          <a:bodyPr rtlCol="0" anchor="ctr"/>
-          <a:lstStyle/>
-          <a:p>
-            <a:pPr algn="ctr"/>
-            <a:endParaRPr lang="pt-BR"/>
-          </a:p>
-        </p:txBody>
-      </p:sp>
-      <p:sp>
-        <p:nvSpPr>
-          <p:cNvPr id="25" name="Retângulo: Cantos Arredondados 24">
-            <a:extLst>
-              <a:ext uri="{FF2B5EF4-FFF2-40B4-BE49-F238E27FC236}">
-                <a16:creationId xmlns:a16="http://schemas.microsoft.com/office/drawing/2014/main" id="{038DAC8C-9445-47F5-BAB3-7A487E26EBED}"/>
-              </a:ext>
-            </a:extLst>
-          </p:cNvPr>
-          <p:cNvSpPr/>
-          <p:nvPr/>
-        </p:nvSpPr>
-        <p:spPr>
-          <a:xfrm>
-            <a:off x="988501" y="3339548"/>
-            <a:ext cx="1751825" cy="745757"/>
-          </a:xfrm>
-          <a:prstGeom prst="roundRect">
-            <a:avLst/>
-          </a:prstGeom>
-          <a:solidFill>
-            <a:schemeClr val="bg1"/>
-          </a:solidFill>
-        </p:spPr>
-        <p:style>
-          <a:lnRef idx="2">
-            <a:schemeClr val="accent1">
-              <a:shade val="50000"/>
-            </a:schemeClr>
-          </a:lnRef>
-          <a:fillRef idx="1">
-            <a:schemeClr val="accent1"/>
-          </a:fillRef>
-          <a:effectRef idx="0">
-            <a:schemeClr val="accent1"/>
-          </a:effectRef>
-          <a:fontRef idx="minor">
-            <a:schemeClr val="lt1"/>
-          </a:fontRef>
-        </p:style>
-        <p:txBody>
-          <a:bodyPr rtlCol="0" anchor="ctr"/>
-          <a:lstStyle/>
-          <a:p>
-            <a:pPr algn="ctr"/>
-            <a:endParaRPr lang="pt-BR"/>
-          </a:p>
-        </p:txBody>
-      </p:sp>
-      <p:sp>
-        <p:nvSpPr>
-          <p:cNvPr id="26" name="CaixaDeTexto 25">
-            <a:extLst>
-              <a:ext uri="{FF2B5EF4-FFF2-40B4-BE49-F238E27FC236}">
-                <a16:creationId xmlns:a16="http://schemas.microsoft.com/office/drawing/2014/main" id="{4BD22406-9610-465C-94E2-37D3CE2AE8BA}"/>
-              </a:ext>
-            </a:extLst>
-          </p:cNvPr>
-          <p:cNvSpPr txBox="1"/>
-          <p:nvPr/>
-        </p:nvSpPr>
-        <p:spPr>
-          <a:xfrm>
-            <a:off x="1126435" y="3339548"/>
-            <a:ext cx="3567722" cy="369332"/>
-          </a:xfrm>
-          <a:prstGeom prst="rect">
-            <a:avLst/>
-          </a:prstGeom>
-          <a:noFill/>
-        </p:spPr>
-        <p:txBody>
-          <a:bodyPr wrap="square" rtlCol="0">
-            <a:spAutoFit/>
-          </a:bodyPr>
-          <a:lstStyle/>
-          <a:p>
-            <a:r>
-              <a:rPr lang="pt-BR" dirty="0"/>
-              <a:t>Gerar alertas </a:t>
-            </a:r>
-          </a:p>
-        </p:txBody>
-      </p:sp>
       <p:pic>
         <p:nvPicPr>
-          <p:cNvPr id="1032" name="Picture 8" descr="Java Runtime | Download | TechTudo">
-            <a:extLst>
-              <a:ext uri="{FF2B5EF4-FFF2-40B4-BE49-F238E27FC236}">
-                <a16:creationId xmlns:a16="http://schemas.microsoft.com/office/drawing/2014/main" id="{52FC3375-3FF2-433C-9F1A-0B55322F582E}"/>
-              </a:ext>
-            </a:extLst>
-          </p:cNvPr>
-          <p:cNvPicPr>
-            <a:picLocks noChangeAspect="1" noChangeArrowheads="1"/>
-          </p:cNvPicPr>
-          <p:nvPr/>
-        </p:nvPicPr>
-        <p:blipFill>
-          <a:blip r:embed="rId4">
-            <a:extLst>
-              <a:ext uri="{28A0092B-C50C-407E-A947-70E740481C1C}">
-                <a14:useLocalDpi xmlns:a14="http://schemas.microsoft.com/office/drawing/2010/main" val="0"/>
-              </a:ext>
-            </a:extLst>
-          </a:blip>
-          <a:srcRect/>
-          <a:stretch>
-            <a:fillRect/>
-          </a:stretch>
-        </p:blipFill>
-        <p:spPr bwMode="auto">
-          <a:xfrm>
-            <a:off x="3215100" y="3264505"/>
-            <a:ext cx="1581761" cy="888749"/>
-          </a:xfrm>
-          <a:prstGeom prst="rect">
-            <a:avLst/>
-          </a:prstGeom>
-          <a:noFill/>
-          <a:extLst>
-            <a:ext uri="{909E8E84-426E-40DD-AFC4-6F175D3DCCD1}">
-              <a14:hiddenFill xmlns:a14="http://schemas.microsoft.com/office/drawing/2010/main">
-                <a:solidFill>
-                  <a:srgbClr val="FFFFFF"/>
-                </a:solidFill>
-              </a14:hiddenFill>
-            </a:ext>
-          </a:extLst>
-        </p:spPr>
-      </p:pic>
-      <p:sp>
-        <p:nvSpPr>
-          <p:cNvPr id="27" name="Seta: para a Direita 26">
-            <a:extLst>
-              <a:ext uri="{FF2B5EF4-FFF2-40B4-BE49-F238E27FC236}">
-                <a16:creationId xmlns:a16="http://schemas.microsoft.com/office/drawing/2014/main" id="{5CBF1EB5-9234-4DF1-951C-630EDAD5C39B}"/>
-              </a:ext>
-            </a:extLst>
-          </p:cNvPr>
-          <p:cNvSpPr/>
-          <p:nvPr/>
-        </p:nvSpPr>
-        <p:spPr>
-          <a:xfrm>
-            <a:off x="5340626" y="2316680"/>
-            <a:ext cx="530087" cy="386763"/>
-          </a:xfrm>
-          <a:prstGeom prst="rightArrow">
-            <a:avLst/>
-          </a:prstGeom>
-        </p:spPr>
-        <p:style>
-          <a:lnRef idx="2">
-            <a:schemeClr val="accent1">
-              <a:shade val="50000"/>
-            </a:schemeClr>
-          </a:lnRef>
-          <a:fillRef idx="1">
-            <a:schemeClr val="accent1"/>
-          </a:fillRef>
-          <a:effectRef idx="0">
-            <a:schemeClr val="accent1"/>
-          </a:effectRef>
-          <a:fontRef idx="minor">
-            <a:schemeClr val="lt1"/>
-          </a:fontRef>
-        </p:style>
-        <p:txBody>
-          <a:bodyPr rtlCol="0" anchor="ctr"/>
-          <a:lstStyle/>
-          <a:p>
-            <a:pPr algn="ctr"/>
-            <a:endParaRPr lang="pt-BR"/>
-          </a:p>
-        </p:txBody>
-      </p:sp>
-      <p:pic>
-        <p:nvPicPr>
-          <p:cNvPr id="1034" name="Picture 10" descr="Política de Ciclo de Vida da Microsoft">
-            <a:extLst>
-              <a:ext uri="{FF2B5EF4-FFF2-40B4-BE49-F238E27FC236}">
-                <a16:creationId xmlns:a16="http://schemas.microsoft.com/office/drawing/2014/main" id="{3109E731-D4F2-4C5D-8480-434E943CCCC9}"/>
-              </a:ext>
-            </a:extLst>
-          </p:cNvPr>
-          <p:cNvPicPr>
-            <a:picLocks noChangeAspect="1" noChangeArrowheads="1"/>
-          </p:cNvPicPr>
-          <p:nvPr/>
-        </p:nvPicPr>
-        <p:blipFill>
-          <a:blip r:embed="rId5">
-            <a:extLst>
-              <a:ext uri="{28A0092B-C50C-407E-A947-70E740481C1C}">
-                <a14:useLocalDpi xmlns:a14="http://schemas.microsoft.com/office/drawing/2010/main" val="0"/>
-              </a:ext>
-            </a:extLst>
-          </a:blip>
-          <a:srcRect/>
-          <a:stretch>
-            <a:fillRect/>
-          </a:stretch>
-        </p:blipFill>
-        <p:spPr bwMode="auto">
-          <a:xfrm>
-            <a:off x="9852355" y="985296"/>
-            <a:ext cx="1368009" cy="768647"/>
-          </a:xfrm>
-          <a:prstGeom prst="rect">
-            <a:avLst/>
-          </a:prstGeom>
-          <a:noFill/>
-          <a:extLst>
-            <a:ext uri="{909E8E84-426E-40DD-AFC4-6F175D3DCCD1}">
-              <a14:hiddenFill xmlns:a14="http://schemas.microsoft.com/office/drawing/2010/main">
-                <a:solidFill>
-                  <a:srgbClr val="FFFFFF"/>
-                </a:solidFill>
-              </a14:hiddenFill>
-            </a:ext>
-          </a:extLst>
-        </p:spPr>
-      </p:pic>
-      <p:sp>
-        <p:nvSpPr>
-          <p:cNvPr id="28" name="Retângulo: Cantos Arredondados 27">
-            <a:extLst>
-              <a:ext uri="{FF2B5EF4-FFF2-40B4-BE49-F238E27FC236}">
-                <a16:creationId xmlns:a16="http://schemas.microsoft.com/office/drawing/2014/main" id="{EE5A345F-0716-450D-886A-FDBB9F2A4811}"/>
-              </a:ext>
-            </a:extLst>
-          </p:cNvPr>
-          <p:cNvSpPr/>
-          <p:nvPr/>
-        </p:nvSpPr>
-        <p:spPr>
-          <a:xfrm>
-            <a:off x="6425023" y="1845573"/>
-            <a:ext cx="2803601" cy="2142544"/>
-          </a:xfrm>
-          <a:prstGeom prst="roundRect">
-            <a:avLst/>
-          </a:prstGeom>
-          <a:solidFill>
-            <a:schemeClr val="bg1"/>
-          </a:solidFill>
-        </p:spPr>
-        <p:style>
-          <a:lnRef idx="2">
-            <a:schemeClr val="accent1">
-              <a:shade val="50000"/>
-            </a:schemeClr>
-          </a:lnRef>
-          <a:fillRef idx="1">
-            <a:schemeClr val="accent1"/>
-          </a:fillRef>
-          <a:effectRef idx="0">
-            <a:schemeClr val="accent1"/>
-          </a:effectRef>
-          <a:fontRef idx="minor">
-            <a:schemeClr val="lt1"/>
-          </a:fontRef>
-        </p:style>
-        <p:txBody>
-          <a:bodyPr rtlCol="0" anchor="ctr"/>
-          <a:lstStyle/>
-          <a:p>
-            <a:pPr algn="ctr"/>
-            <a:endParaRPr lang="pt-BR"/>
-          </a:p>
-        </p:txBody>
-      </p:sp>
-      <p:pic>
-        <p:nvPicPr>
-          <p:cNvPr id="33" name="Picture 4" descr="Resultado de imagem para HTML5 icon">
-            <a:extLst>
-              <a:ext uri="{FF2B5EF4-FFF2-40B4-BE49-F238E27FC236}">
-                <a16:creationId xmlns:a16="http://schemas.microsoft.com/office/drawing/2014/main" id="{38EBA9B7-37E0-4CF9-A0BA-623CA4AC44D2}"/>
-              </a:ext>
-            </a:extLst>
-          </p:cNvPr>
-          <p:cNvPicPr>
-            <a:picLocks noChangeAspect="1" noChangeArrowheads="1"/>
-          </p:cNvPicPr>
-          <p:nvPr/>
-        </p:nvPicPr>
-        <p:blipFill>
-          <a:blip r:embed="rId6" cstate="hqprint">
-            <a:duotone>
-              <a:schemeClr val="bg2">
-                <a:shade val="45000"/>
-                <a:satMod val="135000"/>
-              </a:schemeClr>
-              <a:prstClr val="white"/>
-            </a:duotone>
-            <a:extLst>
-              <a:ext uri="{28A0092B-C50C-407E-A947-70E740481C1C}">
-                <a14:useLocalDpi xmlns:a14="http://schemas.microsoft.com/office/drawing/2010/main" val="0"/>
-              </a:ext>
-            </a:extLst>
-          </a:blip>
-          <a:srcRect/>
-          <a:stretch>
-            <a:fillRect/>
-          </a:stretch>
-        </p:blipFill>
-        <p:spPr bwMode="auto">
-          <a:xfrm>
-            <a:off x="7670186" y="1919521"/>
-            <a:ext cx="1459079" cy="856065"/>
-          </a:xfrm>
-          <a:prstGeom prst="rect">
-            <a:avLst/>
-          </a:prstGeom>
-          <a:noFill/>
-          <a:extLst>
-            <a:ext uri="{909E8E84-426E-40DD-AFC4-6F175D3DCCD1}">
-              <a14:hiddenFill xmlns:a14="http://schemas.microsoft.com/office/drawing/2010/main">
-                <a:solidFill>
-                  <a:srgbClr val="FFFFFF"/>
-                </a:solidFill>
-              </a14:hiddenFill>
-            </a:ext>
-          </a:extLst>
-        </p:spPr>
-      </p:pic>
-      <p:pic>
-        <p:nvPicPr>
-          <p:cNvPr id="35" name="Imagem 34">
-            <a:extLst>
-              <a:ext uri="{FF2B5EF4-FFF2-40B4-BE49-F238E27FC236}">
-                <a16:creationId xmlns:a16="http://schemas.microsoft.com/office/drawing/2014/main" id="{7621D96A-6522-4A94-9FB5-8FE8F270C4F6}"/>
+          <p:cNvPr id="8" name="Imagem 7">
+            <a:extLst>
+              <a:ext uri="{FF2B5EF4-FFF2-40B4-BE49-F238E27FC236}">
+                <a16:creationId xmlns:a16="http://schemas.microsoft.com/office/drawing/2014/main" xmlns="" id="{7621D96A-6522-4A94-9FB5-8FE8F270C4F6}"/>
               </a:ext>
             </a:extLst>
           </p:cNvPr>
@@ -4163,11 +3427,11 @@
           <p:nvPr/>
         </p:nvPicPr>
         <p:blipFill>
-          <a:blip r:embed="rId7">
+          <a:blip r:embed="rId3">
             <a:extLst>
               <a:ext uri="{BEBA8EAE-BF5A-486C-A8C5-ECC9F3942E4B}">
                 <a14:imgProps xmlns:a14="http://schemas.microsoft.com/office/drawing/2010/main">
-                  <a14:imgLayer r:embed="rId8">
+                  <a14:imgLayer r:embed="rId4">
                     <a14:imgEffect>
                       <a14:backgroundRemoval t="10000" b="90000" l="8696" r="90000">
                         <a14:foregroundMark x1="40870" y1="28261" x2="40870" y2="28261"/>
@@ -4200,7 +3464,7 @@
         </p:blipFill>
         <p:spPr>
           <a:xfrm>
-            <a:off x="6432618" y="2157498"/>
+            <a:off x="5447040" y="1572657"/>
             <a:ext cx="1212531" cy="1212531"/>
           </a:xfrm>
           <a:prstGeom prst="rect">
@@ -4208,55 +3472,41 @@
           </a:prstGeom>
         </p:spPr>
       </p:pic>
-      <p:sp>
-        <p:nvSpPr>
-          <p:cNvPr id="29" name="CaixaDeTexto 28">
-            <a:extLst>
-              <a:ext uri="{FF2B5EF4-FFF2-40B4-BE49-F238E27FC236}">
-                <a16:creationId xmlns:a16="http://schemas.microsoft.com/office/drawing/2014/main" id="{6CAD3669-1A73-408B-AAF3-AE9252BA1FDA}"/>
-              </a:ext>
-            </a:extLst>
-          </p:cNvPr>
-          <p:cNvSpPr txBox="1"/>
+      <p:pic>
+        <p:nvPicPr>
+          <p:cNvPr id="10" name="Imagem 9"/>
+          <p:cNvPicPr>
+            <a:picLocks noChangeAspect="1"/>
+          </p:cNvPicPr>
           <p:nvPr/>
-        </p:nvSpPr>
+        </p:nvPicPr>
+        <p:blipFill rotWithShape="1">
+          <a:blip r:embed="rId5">
+            <a:extLst>
+              <a:ext uri="{28A0092B-C50C-407E-A947-70E740481C1C}">
+                <a14:useLocalDpi xmlns:a14="http://schemas.microsoft.com/office/drawing/2010/main" val="0"/>
+              </a:ext>
+            </a:extLst>
+          </a:blip>
+          <a:srcRect t="23994" b="21517"/>
+          <a:stretch/>
+        </p:blipFill>
         <p:spPr>
           <a:xfrm>
-            <a:off x="7362113" y="3611691"/>
-            <a:ext cx="1866511" cy="369332"/>
+            <a:off x="3765178" y="1754462"/>
+            <a:ext cx="1185628" cy="666500"/>
           </a:xfrm>
           <a:prstGeom prst="rect">
             <a:avLst/>
           </a:prstGeom>
-          <a:noFill/>
-        </p:spPr>
-        <p:txBody>
-          <a:bodyPr wrap="square" rtlCol="0">
-            <a:spAutoFit/>
-          </a:bodyPr>
-          <a:lstStyle/>
-          <a:p>
-            <a:r>
-              <a:rPr lang="pt-BR" dirty="0"/>
-              <a:t>Site </a:t>
-            </a:r>
-            <a:r>
-              <a:rPr lang="pt-BR" dirty="0" err="1"/>
-              <a:t>Primeloitters</a:t>
-            </a:r>
-            <a:r>
-              <a:rPr lang="pt-BR" dirty="0"/>
-              <a:t> </a:t>
-            </a:r>
-          </a:p>
-        </p:txBody>
-      </p:sp>
+        </p:spPr>
+      </p:pic>
       <p:pic>
         <p:nvPicPr>
-          <p:cNvPr id="1040" name="Picture 16" descr="A year of contributing to Chart.js - Tanner Linsley - Medium">
-            <a:extLst>
-              <a:ext uri="{FF2B5EF4-FFF2-40B4-BE49-F238E27FC236}">
-                <a16:creationId xmlns:a16="http://schemas.microsoft.com/office/drawing/2014/main" id="{81B651A6-2CB3-4749-8B2B-D27969794B70}"/>
+          <p:cNvPr id="11" name="Picture 10" descr="Microsoft SQL Server logo.">
+            <a:extLst>
+              <a:ext uri="{FF2B5EF4-FFF2-40B4-BE49-F238E27FC236}">
+                <a16:creationId xmlns:a16="http://schemas.microsoft.com/office/drawing/2014/main" xmlns="" id="{22A58C3D-FD8C-4D05-8644-912BFD3AC7B5}"/>
               </a:ext>
             </a:extLst>
           </p:cNvPr>
@@ -4266,7 +3516,7 @@
           <p:nvPr/>
         </p:nvPicPr>
         <p:blipFill>
-          <a:blip r:embed="rId9">
+          <a:blip r:embed="rId6" cstate="print">
             <a:extLst>
               <a:ext uri="{28A0092B-C50C-407E-A947-70E740481C1C}">
                 <a14:useLocalDpi xmlns:a14="http://schemas.microsoft.com/office/drawing/2010/main" val="0"/>
@@ -4280,8 +3530,8 @@
         </p:blipFill>
         <p:spPr bwMode="auto">
           <a:xfrm>
-            <a:off x="7842820" y="2740932"/>
-            <a:ext cx="850361" cy="852770"/>
+            <a:off x="7744800" y="713417"/>
+            <a:ext cx="933004" cy="757226"/>
           </a:xfrm>
           <a:prstGeom prst="rect">
             <a:avLst/>
@@ -4300,27 +3550,19 @@
       </p:pic>
       <p:sp>
         <p:nvSpPr>
-          <p:cNvPr id="32" name="Retângulo: Cantos Arredondados 31">
-            <a:extLst>
-              <a:ext uri="{FF2B5EF4-FFF2-40B4-BE49-F238E27FC236}">
-                <a16:creationId xmlns:a16="http://schemas.microsoft.com/office/drawing/2014/main" id="{7658CA15-84E4-4760-A1AD-43F9225F03FC}"/>
-              </a:ext>
-            </a:extLst>
-          </p:cNvPr>
+          <p:cNvPr id="13" name="Raio 12"/>
           <p:cNvSpPr/>
           <p:nvPr/>
         </p:nvSpPr>
         <p:spPr>
-          <a:xfrm>
-            <a:off x="9426295" y="1845573"/>
-            <a:ext cx="1908313" cy="1648578"/>
-          </a:xfrm>
-          <a:prstGeom prst="roundRect">
+          <a:xfrm flipH="1">
+            <a:off x="2972363" y="2874212"/>
+            <a:ext cx="1048870" cy="1236252"/>
+          </a:xfrm>
+          <a:prstGeom prst="lightningBolt">
             <a:avLst/>
           </a:prstGeom>
-          <a:solidFill>
-            <a:schemeClr val="bg1"/>
-          </a:solidFill>
+          <a:noFill/>
         </p:spPr>
         <p:style>
           <a:lnRef idx="2">
@@ -4347,55 +3589,185 @@
           </a:p>
         </p:txBody>
       </p:sp>
-      <p:sp>
-        <p:nvSpPr>
-          <p:cNvPr id="34" name="CaixaDeTexto 33">
-            <a:extLst>
-              <a:ext uri="{FF2B5EF4-FFF2-40B4-BE49-F238E27FC236}">
-                <a16:creationId xmlns:a16="http://schemas.microsoft.com/office/drawing/2014/main" id="{7BA216B7-2AB3-4FFB-B86F-78E9E6E9600E}"/>
-              </a:ext>
-            </a:extLst>
-          </p:cNvPr>
-          <p:cNvSpPr txBox="1"/>
+      <p:pic>
+        <p:nvPicPr>
+          <p:cNvPr id="14" name="Imagem 13"/>
+          <p:cNvPicPr>
+            <a:picLocks noChangeAspect="1"/>
+          </p:cNvPicPr>
           <p:nvPr/>
-        </p:nvSpPr>
+        </p:nvPicPr>
+        <p:blipFill rotWithShape="1">
+          <a:blip r:embed="rId7">
+            <a:duotone>
+              <a:schemeClr val="accent1">
+                <a:shade val="45000"/>
+                <a:satMod val="135000"/>
+              </a:schemeClr>
+              <a:prstClr val="white"/>
+            </a:duotone>
+            <a:extLst>
+              <a:ext uri="{28A0092B-C50C-407E-A947-70E740481C1C}">
+                <a14:useLocalDpi xmlns:a14="http://schemas.microsoft.com/office/drawing/2010/main" val="0"/>
+              </a:ext>
+            </a:extLst>
+          </a:blip>
+          <a:srcRect t="12927" b="13567"/>
+          <a:stretch/>
+        </p:blipFill>
         <p:spPr>
           <a:xfrm>
-            <a:off x="9532312" y="2826241"/>
-            <a:ext cx="1802296" cy="646331"/>
+            <a:off x="2470559" y="5096435"/>
+            <a:ext cx="2250142" cy="1653990"/>
           </a:xfrm>
           <a:prstGeom prst="rect">
             <a:avLst/>
           </a:prstGeom>
+        </p:spPr>
+      </p:pic>
+      <p:sp>
+        <p:nvSpPr>
+          <p:cNvPr id="15" name="Retângulo de cantos arredondados 14"/>
+          <p:cNvSpPr/>
+          <p:nvPr/>
+        </p:nvSpPr>
+        <p:spPr>
+          <a:xfrm>
+            <a:off x="167413" y="4251567"/>
+            <a:ext cx="4606293" cy="2541490"/>
+          </a:xfrm>
+          <a:prstGeom prst="roundRect">
+            <a:avLst/>
+          </a:prstGeom>
           <a:noFill/>
         </p:spPr>
-        <p:txBody>
-          <a:bodyPr wrap="square" rtlCol="0">
-            <a:spAutoFit/>
-          </a:bodyPr>
-          <a:lstStyle/>
-          <a:p>
-            <a:r>
-              <a:rPr lang="pt-BR" dirty="0"/>
-              <a:t>Banco de dados </a:t>
-            </a:r>
-            <a:r>
-              <a:rPr lang="pt-BR" dirty="0" err="1"/>
-              <a:t>KPRunnin</a:t>
-            </a:r>
-            <a:r>
-              <a:rPr lang="pt-BR" dirty="0"/>
-              <a:t>’</a:t>
-            </a:r>
+        <p:style>
+          <a:lnRef idx="2">
+            <a:schemeClr val="accent1">
+              <a:shade val="50000"/>
+            </a:schemeClr>
+          </a:lnRef>
+          <a:fillRef idx="1">
+            <a:schemeClr val="accent1"/>
+          </a:fillRef>
+          <a:effectRef idx="0">
+            <a:schemeClr val="accent1"/>
+          </a:effectRef>
+          <a:fontRef idx="minor">
+            <a:schemeClr val="lt1"/>
+          </a:fontRef>
+        </p:style>
+        <p:txBody>
+          <a:bodyPr rtlCol="0" anchor="ctr"/>
+          <a:lstStyle/>
+          <a:p>
+            <a:pPr algn="ctr"/>
+            <a:endParaRPr lang="pt-BR"/>
           </a:p>
         </p:txBody>
       </p:sp>
       <p:pic>
         <p:nvPicPr>
-          <p:cNvPr id="45" name="Picture 10" descr="Microsoft SQL Server logo.">
-            <a:extLst>
-              <a:ext uri="{FF2B5EF4-FFF2-40B4-BE49-F238E27FC236}">
-                <a16:creationId xmlns:a16="http://schemas.microsoft.com/office/drawing/2014/main" id="{22A58C3D-FD8C-4D05-8644-912BFD3AC7B5}"/>
+          <p:cNvPr id="16" name="Imagem 15">
+            <a:extLst>
+              <a:ext uri="{FF2B5EF4-FFF2-40B4-BE49-F238E27FC236}">
+                <a16:creationId xmlns:a16="http://schemas.microsoft.com/office/drawing/2014/main" xmlns="" id="{7621D96A-6522-4A94-9FB5-8FE8F270C4F6}"/>
+              </a:ext>
+            </a:extLst>
+          </p:cNvPr>
+          <p:cNvPicPr>
+            <a:picLocks noChangeAspect="1"/>
+          </p:cNvPicPr>
+          <p:nvPr/>
+        </p:nvPicPr>
+        <p:blipFill>
+          <a:blip r:embed="rId3" cstate="print">
+            <a:extLst>
+              <a:ext uri="{BEBA8EAE-BF5A-486C-A8C5-ECC9F3942E4B}">
+                <a14:imgProps xmlns:a14="http://schemas.microsoft.com/office/drawing/2010/main">
+                  <a14:imgLayer r:embed="rId4">
+                    <a14:imgEffect>
+                      <a14:backgroundRemoval t="10000" b="90000" l="8696" r="90000">
+                        <a14:foregroundMark x1="40870" y1="28261" x2="40870" y2="28261"/>
+                        <a14:foregroundMark x1="65217" y1="21739" x2="65217" y2="21739"/>
+                        <a14:foregroundMark x1="55217" y1="59565" x2="55217" y2="59565"/>
+                        <a14:foregroundMark x1="45652" y1="87826" x2="45652" y2="87826"/>
+                        <a14:foregroundMark x1="84783" y1="27826" x2="84783" y2="27826"/>
+                        <a14:foregroundMark x1="77391" y1="26522" x2="77391" y2="26522"/>
+                        <a14:foregroundMark x1="63913" y1="23043" x2="63913" y2="23043"/>
+                        <a14:foregroundMark x1="19130" y1="26957" x2="19130" y2="26957"/>
+                        <a14:foregroundMark x1="8696" y1="30870" x2="8696" y2="30870"/>
+                        <a14:backgroundMark x1="83043" y1="45652" x2="83043" y2="45652"/>
+                        <a14:backgroundMark x1="83043" y1="45652" x2="83043" y2="45652"/>
+                        <a14:backgroundMark x1="83043" y1="45652" x2="79565" y2="45217"/>
+                        <a14:backgroundMark x1="90435" y1="47391" x2="80435" y2="43913"/>
+                        <a14:backgroundMark x1="84348" y1="45652" x2="84348" y2="45652"/>
+                      </a14:backgroundRemoval>
+                    </a14:imgEffect>
+                  </a14:imgLayer>
+                </a14:imgProps>
+              </a:ext>
+              <a:ext uri="{28A0092B-C50C-407E-A947-70E740481C1C}">
+                <a14:useLocalDpi xmlns:a14="http://schemas.microsoft.com/office/drawing/2010/main" val="0"/>
+              </a:ext>
+            </a:extLst>
+          </a:blip>
+          <a:stretch>
+            <a:fillRect/>
+          </a:stretch>
+        </p:blipFill>
+        <p:spPr>
+          <a:xfrm>
+            <a:off x="2950180" y="5207792"/>
+            <a:ext cx="814998" cy="814996"/>
+          </a:xfrm>
+          <a:prstGeom prst="rect">
+            <a:avLst/>
+          </a:prstGeom>
+        </p:spPr>
+      </p:pic>
+      <p:pic>
+        <p:nvPicPr>
+          <p:cNvPr id="17" name="Imagem 16">
+            <a:extLst>
+              <a:ext uri="{FF2B5EF4-FFF2-40B4-BE49-F238E27FC236}">
+                <a16:creationId xmlns:a16="http://schemas.microsoft.com/office/drawing/2014/main" xmlns="" id="{54484672-6964-4D0F-A8D1-B42BFA789A53}"/>
+              </a:ext>
+            </a:extLst>
+          </p:cNvPr>
+          <p:cNvPicPr>
+            <a:picLocks noChangeAspect="1"/>
+          </p:cNvPicPr>
+          <p:nvPr/>
+        </p:nvPicPr>
+        <p:blipFill>
+          <a:blip r:embed="rId8">
+            <a:extLst>
+              <a:ext uri="{28A0092B-C50C-407E-A947-70E740481C1C}">
+                <a14:useLocalDpi xmlns:a14="http://schemas.microsoft.com/office/drawing/2010/main" val="0"/>
+              </a:ext>
+            </a:extLst>
+          </a:blip>
+          <a:stretch>
+            <a:fillRect/>
+          </a:stretch>
+        </p:blipFill>
+        <p:spPr>
+          <a:xfrm>
+            <a:off x="1323154" y="6071565"/>
+            <a:ext cx="622520" cy="622520"/>
+          </a:xfrm>
+          <a:prstGeom prst="rect">
+            <a:avLst/>
+          </a:prstGeom>
+        </p:spPr>
+      </p:pic>
+      <p:pic>
+        <p:nvPicPr>
+          <p:cNvPr id="18" name="Picture 2" descr="Aprendendo a utilizar as funcionalidades do Jmeter - Danilo Jose ...">
+            <a:extLst>
+              <a:ext uri="{FF2B5EF4-FFF2-40B4-BE49-F238E27FC236}">
+                <a16:creationId xmlns:a16="http://schemas.microsoft.com/office/drawing/2014/main" xmlns="" id="{9A9337F9-39AF-4304-A13B-6556493E42F7}"/>
               </a:ext>
             </a:extLst>
           </p:cNvPr>
@@ -4405,7 +3777,7 @@
           <p:nvPr/>
         </p:nvPicPr>
         <p:blipFill>
-          <a:blip r:embed="rId10" cstate="hqprint">
+          <a:blip r:embed="rId9" cstate="print">
             <a:extLst>
               <a:ext uri="{28A0092B-C50C-407E-A947-70E740481C1C}">
                 <a14:useLocalDpi xmlns:a14="http://schemas.microsoft.com/office/drawing/2010/main" val="0"/>
@@ -4419,8 +3791,8 @@
         </p:blipFill>
         <p:spPr bwMode="auto">
           <a:xfrm>
-            <a:off x="9617963" y="1833186"/>
-            <a:ext cx="1324412" cy="1074892"/>
+            <a:off x="929168" y="5382478"/>
+            <a:ext cx="1410492" cy="479188"/>
           </a:xfrm>
           <a:prstGeom prst="rect">
             <a:avLst/>
@@ -4437,10 +3809,530 @@
           </a:extLst>
         </p:spPr>
       </p:pic>
+      <p:pic>
+        <p:nvPicPr>
+          <p:cNvPr id="19" name="Picture 8" descr="Java Runtime | Download | TechTudo">
+            <a:extLst>
+              <a:ext uri="{FF2B5EF4-FFF2-40B4-BE49-F238E27FC236}">
+                <a16:creationId xmlns:a16="http://schemas.microsoft.com/office/drawing/2014/main" xmlns="" id="{52FC3375-3FF2-433C-9F1A-0B55322F582E}"/>
+              </a:ext>
+            </a:extLst>
+          </p:cNvPr>
+          <p:cNvPicPr>
+            <a:picLocks noChangeAspect="1" noChangeArrowheads="1"/>
+          </p:cNvPicPr>
+          <p:nvPr/>
+        </p:nvPicPr>
+        <p:blipFill>
+          <a:blip r:embed="rId10">
+            <a:extLst>
+              <a:ext uri="{28A0092B-C50C-407E-A947-70E740481C1C}">
+                <a14:useLocalDpi xmlns:a14="http://schemas.microsoft.com/office/drawing/2010/main" val="0"/>
+              </a:ext>
+            </a:extLst>
+          </a:blip>
+          <a:srcRect/>
+          <a:stretch>
+            <a:fillRect/>
+          </a:stretch>
+        </p:blipFill>
+        <p:spPr bwMode="auto">
+          <a:xfrm>
+            <a:off x="905743" y="4331605"/>
+            <a:ext cx="1581761" cy="888749"/>
+          </a:xfrm>
+          <a:prstGeom prst="rect">
+            <a:avLst/>
+          </a:prstGeom>
+          <a:noFill/>
+          <a:extLst>
+            <a:ext uri="{909E8E84-426E-40DD-AFC4-6F175D3DCCD1}">
+              <a14:hiddenFill xmlns:a14="http://schemas.microsoft.com/office/drawing/2010/main">
+                <a:solidFill>
+                  <a:srgbClr val="FFFFFF"/>
+                </a:solidFill>
+              </a14:hiddenFill>
+            </a:ext>
+          </a:extLst>
+        </p:spPr>
+      </p:pic>
+      <p:pic>
+        <p:nvPicPr>
+          <p:cNvPr id="20" name="Imagem 19"/>
+          <p:cNvPicPr>
+            <a:picLocks noChangeAspect="1"/>
+          </p:cNvPicPr>
+          <p:nvPr/>
+        </p:nvPicPr>
+        <p:blipFill rotWithShape="1">
+          <a:blip r:embed="rId11">
+            <a:extLst>
+              <a:ext uri="{28A0092B-C50C-407E-A947-70E740481C1C}">
+                <a14:useLocalDpi xmlns:a14="http://schemas.microsoft.com/office/drawing/2010/main" val="0"/>
+              </a:ext>
+            </a:extLst>
+          </a:blip>
+          <a:srcRect r="74221"/>
+          <a:stretch/>
+        </p:blipFill>
+        <p:spPr>
+          <a:xfrm>
+            <a:off x="2727315" y="4486753"/>
+            <a:ext cx="1260728" cy="528712"/>
+          </a:xfrm>
+          <a:prstGeom prst="rect">
+            <a:avLst/>
+          </a:prstGeom>
+        </p:spPr>
+      </p:pic>
+      <p:sp>
+        <p:nvSpPr>
+          <p:cNvPr id="21" name="Retângulo de cantos arredondados 20"/>
+          <p:cNvSpPr/>
+          <p:nvPr/>
+        </p:nvSpPr>
+        <p:spPr>
+          <a:xfrm>
+            <a:off x="7409140" y="4251567"/>
+            <a:ext cx="4606293" cy="2541490"/>
+          </a:xfrm>
+          <a:prstGeom prst="roundRect">
+            <a:avLst/>
+          </a:prstGeom>
+          <a:noFill/>
+        </p:spPr>
+        <p:style>
+          <a:lnRef idx="2">
+            <a:schemeClr val="accent1">
+              <a:shade val="50000"/>
+            </a:schemeClr>
+          </a:lnRef>
+          <a:fillRef idx="1">
+            <a:schemeClr val="accent1"/>
+          </a:fillRef>
+          <a:effectRef idx="0">
+            <a:schemeClr val="accent1"/>
+          </a:effectRef>
+          <a:fontRef idx="minor">
+            <a:schemeClr val="lt1"/>
+          </a:fontRef>
+        </p:style>
+        <p:txBody>
+          <a:bodyPr rtlCol="0" anchor="ctr"/>
+          <a:lstStyle/>
+          <a:p>
+            <a:pPr algn="ctr"/>
+            <a:endParaRPr lang="pt-BR"/>
+          </a:p>
+        </p:txBody>
+      </p:sp>
+      <p:sp>
+        <p:nvSpPr>
+          <p:cNvPr id="22" name="Raio 21"/>
+          <p:cNvSpPr/>
+          <p:nvPr/>
+        </p:nvSpPr>
+        <p:spPr>
+          <a:xfrm>
+            <a:off x="8358744" y="2883782"/>
+            <a:ext cx="1040750" cy="1226682"/>
+          </a:xfrm>
+          <a:prstGeom prst="lightningBolt">
+            <a:avLst/>
+          </a:prstGeom>
+          <a:noFill/>
+        </p:spPr>
+        <p:style>
+          <a:lnRef idx="2">
+            <a:schemeClr val="accent1">
+              <a:shade val="50000"/>
+            </a:schemeClr>
+          </a:lnRef>
+          <a:fillRef idx="1">
+            <a:schemeClr val="accent1"/>
+          </a:fillRef>
+          <a:effectRef idx="0">
+            <a:schemeClr val="accent1"/>
+          </a:effectRef>
+          <a:fontRef idx="minor">
+            <a:schemeClr val="lt1"/>
+          </a:fontRef>
+        </p:style>
+        <p:txBody>
+          <a:bodyPr rtlCol="0" anchor="ctr"/>
+          <a:lstStyle/>
+          <a:p>
+            <a:pPr algn="ctr"/>
+            <a:endParaRPr lang="pt-BR"/>
+          </a:p>
+        </p:txBody>
+      </p:sp>
+      <p:pic>
+        <p:nvPicPr>
+          <p:cNvPr id="23" name="Imagem 22"/>
+          <p:cNvPicPr>
+            <a:picLocks noChangeAspect="1"/>
+          </p:cNvPicPr>
+          <p:nvPr/>
+        </p:nvPicPr>
+        <p:blipFill rotWithShape="1">
+          <a:blip r:embed="rId7">
+            <a:duotone>
+              <a:schemeClr val="accent1">
+                <a:shade val="45000"/>
+                <a:satMod val="135000"/>
+              </a:schemeClr>
+              <a:prstClr val="white"/>
+            </a:duotone>
+            <a:extLst>
+              <a:ext uri="{28A0092B-C50C-407E-A947-70E740481C1C}">
+                <a14:useLocalDpi xmlns:a14="http://schemas.microsoft.com/office/drawing/2010/main" val="0"/>
+              </a:ext>
+            </a:extLst>
+          </a:blip>
+          <a:srcRect t="12927" b="13567"/>
+          <a:stretch/>
+        </p:blipFill>
+        <p:spPr>
+          <a:xfrm>
+            <a:off x="9712286" y="5015465"/>
+            <a:ext cx="2250142" cy="1653990"/>
+          </a:xfrm>
+          <a:prstGeom prst="rect">
+            <a:avLst/>
+          </a:prstGeom>
+        </p:spPr>
+      </p:pic>
+      <p:pic>
+        <p:nvPicPr>
+          <p:cNvPr id="24" name="Imagem 23"/>
+          <p:cNvPicPr>
+            <a:picLocks noChangeAspect="1"/>
+          </p:cNvPicPr>
+          <p:nvPr/>
+        </p:nvPicPr>
+        <p:blipFill rotWithShape="1">
+          <a:blip r:embed="rId12">
+            <a:duotone>
+              <a:schemeClr val="accent1">
+                <a:shade val="45000"/>
+                <a:satMod val="135000"/>
+              </a:schemeClr>
+              <a:prstClr val="white"/>
+            </a:duotone>
+            <a:extLst>
+              <a:ext uri="{28A0092B-C50C-407E-A947-70E740481C1C}">
+                <a14:useLocalDpi xmlns:a14="http://schemas.microsoft.com/office/drawing/2010/main" val="0"/>
+              </a:ext>
+            </a:extLst>
+          </a:blip>
+          <a:srcRect l="21853" t="8057" r="22617" b="6340"/>
+          <a:stretch/>
+        </p:blipFill>
+        <p:spPr>
+          <a:xfrm>
+            <a:off x="7462145" y="5005783"/>
+            <a:ext cx="2197136" cy="1778190"/>
+          </a:xfrm>
+          <a:prstGeom prst="rect">
+            <a:avLst/>
+          </a:prstGeom>
+        </p:spPr>
+      </p:pic>
+      <p:pic>
+        <p:nvPicPr>
+          <p:cNvPr id="25" name="Imagem 24"/>
+          <p:cNvPicPr>
+            <a:picLocks noChangeAspect="1"/>
+          </p:cNvPicPr>
+          <p:nvPr/>
+        </p:nvPicPr>
+        <p:blipFill>
+          <a:blip r:embed="rId13" cstate="print">
+            <a:extLst>
+              <a:ext uri="{28A0092B-C50C-407E-A947-70E740481C1C}">
+                <a14:useLocalDpi xmlns:a14="http://schemas.microsoft.com/office/drawing/2010/main" val="0"/>
+              </a:ext>
+            </a:extLst>
+          </a:blip>
+          <a:stretch>
+            <a:fillRect/>
+          </a:stretch>
+        </p:blipFill>
+        <p:spPr>
+          <a:xfrm>
+            <a:off x="9169340" y="4439921"/>
+            <a:ext cx="1085892" cy="570092"/>
+          </a:xfrm>
+          <a:prstGeom prst="rect">
+            <a:avLst/>
+          </a:prstGeom>
+        </p:spPr>
+      </p:pic>
+      <p:pic>
+        <p:nvPicPr>
+          <p:cNvPr id="26" name="Imagem 25"/>
+          <p:cNvPicPr>
+            <a:picLocks noChangeAspect="1"/>
+          </p:cNvPicPr>
+          <p:nvPr/>
+        </p:nvPicPr>
+        <p:blipFill>
+          <a:blip r:embed="rId14" cstate="print">
+            <a:extLst>
+              <a:ext uri="{28A0092B-C50C-407E-A947-70E740481C1C}">
+                <a14:useLocalDpi xmlns:a14="http://schemas.microsoft.com/office/drawing/2010/main" val="0"/>
+              </a:ext>
+            </a:extLst>
+          </a:blip>
+          <a:stretch>
+            <a:fillRect/>
+          </a:stretch>
+        </p:blipFill>
+        <p:spPr>
+          <a:xfrm>
+            <a:off x="7894002" y="5159512"/>
+            <a:ext cx="783802" cy="783802"/>
+          </a:xfrm>
+          <a:prstGeom prst="rect">
+            <a:avLst/>
+          </a:prstGeom>
+        </p:spPr>
+      </p:pic>
+      <p:pic>
+        <p:nvPicPr>
+          <p:cNvPr id="27" name="Imagem 26"/>
+          <p:cNvPicPr>
+            <a:picLocks noChangeAspect="1"/>
+          </p:cNvPicPr>
+          <p:nvPr/>
+        </p:nvPicPr>
+        <p:blipFill>
+          <a:blip r:embed="rId15" cstate="print">
+            <a:extLst>
+              <a:ext uri="{28A0092B-C50C-407E-A947-70E740481C1C}">
+                <a14:useLocalDpi xmlns:a14="http://schemas.microsoft.com/office/drawing/2010/main" val="0"/>
+              </a:ext>
+            </a:extLst>
+          </a:blip>
+          <a:stretch>
+            <a:fillRect/>
+          </a:stretch>
+        </p:blipFill>
+        <p:spPr>
+          <a:xfrm>
+            <a:off x="9964271" y="5220354"/>
+            <a:ext cx="641312" cy="641312"/>
+          </a:xfrm>
+          <a:prstGeom prst="rect">
+            <a:avLst/>
+          </a:prstGeom>
+        </p:spPr>
+      </p:pic>
+      <p:pic>
+        <p:nvPicPr>
+          <p:cNvPr id="28" name="Imagem 27"/>
+          <p:cNvPicPr>
+            <a:picLocks noChangeAspect="1"/>
+          </p:cNvPicPr>
+          <p:nvPr/>
+        </p:nvPicPr>
+        <p:blipFill>
+          <a:blip r:embed="rId16" cstate="print">
+            <a:extLst>
+              <a:ext uri="{28A0092B-C50C-407E-A947-70E740481C1C}">
+                <a14:useLocalDpi xmlns:a14="http://schemas.microsoft.com/office/drawing/2010/main" val="0"/>
+              </a:ext>
+            </a:extLst>
+          </a:blip>
+          <a:stretch>
+            <a:fillRect/>
+          </a:stretch>
+        </p:blipFill>
+        <p:spPr>
+          <a:xfrm>
+            <a:off x="8786470" y="5363534"/>
+            <a:ext cx="503512" cy="503512"/>
+          </a:xfrm>
+          <a:prstGeom prst="rect">
+            <a:avLst/>
+          </a:prstGeom>
+        </p:spPr>
+      </p:pic>
+      <p:pic>
+        <p:nvPicPr>
+          <p:cNvPr id="30" name="Imagem 29"/>
+          <p:cNvPicPr>
+            <a:picLocks noChangeAspect="1"/>
+          </p:cNvPicPr>
+          <p:nvPr/>
+        </p:nvPicPr>
+        <p:blipFill>
+          <a:blip r:embed="rId17" cstate="print">
+            <a:extLst>
+              <a:ext uri="{28A0092B-C50C-407E-A947-70E740481C1C}">
+                <a14:useLocalDpi xmlns:a14="http://schemas.microsoft.com/office/drawing/2010/main" val="0"/>
+              </a:ext>
+            </a:extLst>
+          </a:blip>
+          <a:stretch>
+            <a:fillRect/>
+          </a:stretch>
+        </p:blipFill>
+        <p:spPr>
+          <a:xfrm>
+            <a:off x="10630585" y="5386264"/>
+            <a:ext cx="517944" cy="517944"/>
+          </a:xfrm>
+          <a:prstGeom prst="rect">
+            <a:avLst/>
+          </a:prstGeom>
+        </p:spPr>
+      </p:pic>
+      <p:sp>
+        <p:nvSpPr>
+          <p:cNvPr id="31" name="CaixaDeTexto 30">
+            <a:extLst>
+              <a:ext uri="{FF2B5EF4-FFF2-40B4-BE49-F238E27FC236}">
+                <a16:creationId xmlns:a16="http://schemas.microsoft.com/office/drawing/2014/main" xmlns="" id="{6CAD3669-1A73-408B-AAF3-AE9252BA1FDA}"/>
+              </a:ext>
+            </a:extLst>
+          </p:cNvPr>
+          <p:cNvSpPr txBox="1"/>
+          <p:nvPr/>
+        </p:nvSpPr>
+        <p:spPr>
+          <a:xfrm>
+            <a:off x="7551398" y="4319043"/>
+            <a:ext cx="1019686" cy="369332"/>
+          </a:xfrm>
+          <a:prstGeom prst="rect">
+            <a:avLst/>
+          </a:prstGeom>
+          <a:noFill/>
+        </p:spPr>
+        <p:txBody>
+          <a:bodyPr wrap="square" rtlCol="0">
+            <a:spAutoFit/>
+          </a:bodyPr>
+          <a:lstStyle/>
+          <a:p>
+            <a:r>
+              <a:rPr lang="pt-BR" dirty="0" smtClean="0">
+                <a:latin typeface="Bahnschrift" panose="020B0502040204020203" pitchFamily="34" charset="0"/>
+              </a:rPr>
+              <a:t>Usuário</a:t>
+            </a:r>
+            <a:endParaRPr lang="pt-BR" dirty="0">
+              <a:latin typeface="Bahnschrift" panose="020B0502040204020203" pitchFamily="34" charset="0"/>
+            </a:endParaRPr>
+          </a:p>
+        </p:txBody>
+      </p:sp>
+      <p:sp>
+        <p:nvSpPr>
+          <p:cNvPr id="32" name="CaixaDeTexto 31">
+            <a:extLst>
+              <a:ext uri="{FF2B5EF4-FFF2-40B4-BE49-F238E27FC236}">
+                <a16:creationId xmlns:a16="http://schemas.microsoft.com/office/drawing/2014/main" xmlns="" id="{6CAD3669-1A73-408B-AAF3-AE9252BA1FDA}"/>
+              </a:ext>
+            </a:extLst>
+          </p:cNvPr>
+          <p:cNvSpPr txBox="1"/>
+          <p:nvPr/>
+        </p:nvSpPr>
+        <p:spPr>
+          <a:xfrm>
+            <a:off x="291937" y="4319043"/>
+            <a:ext cx="600579" cy="369332"/>
+          </a:xfrm>
+          <a:prstGeom prst="rect">
+            <a:avLst/>
+          </a:prstGeom>
+          <a:noFill/>
+        </p:spPr>
+        <p:txBody>
+          <a:bodyPr wrap="square" rtlCol="0">
+            <a:spAutoFit/>
+          </a:bodyPr>
+          <a:lstStyle/>
+          <a:p>
+            <a:r>
+              <a:rPr lang="pt-BR" dirty="0" err="1" smtClean="0">
+                <a:latin typeface="Bahnschrift" panose="020B0502040204020203" pitchFamily="34" charset="0"/>
+              </a:rPr>
+              <a:t>Dev</a:t>
+            </a:r>
+            <a:endParaRPr lang="pt-BR" dirty="0">
+              <a:latin typeface="Bahnschrift" panose="020B0502040204020203" pitchFamily="34" charset="0"/>
+            </a:endParaRPr>
+          </a:p>
+        </p:txBody>
+      </p:sp>
+      <p:pic>
+        <p:nvPicPr>
+          <p:cNvPr id="2" name="Imagem 1"/>
+          <p:cNvPicPr>
+            <a:picLocks noChangeAspect="1"/>
+          </p:cNvPicPr>
+          <p:nvPr/>
+        </p:nvPicPr>
+        <p:blipFill>
+          <a:blip r:embed="rId18">
+            <a:extLst>
+              <a:ext uri="{28A0092B-C50C-407E-A947-70E740481C1C}">
+                <a14:useLocalDpi xmlns:a14="http://schemas.microsoft.com/office/drawing/2010/main" val="0"/>
+              </a:ext>
+            </a:extLst>
+          </a:blip>
+          <a:stretch>
+            <a:fillRect/>
+          </a:stretch>
+        </p:blipFill>
+        <p:spPr>
+          <a:xfrm>
+            <a:off x="5682745" y="530994"/>
+            <a:ext cx="969060" cy="969060"/>
+          </a:xfrm>
+          <a:prstGeom prst="rect">
+            <a:avLst/>
+          </a:prstGeom>
+        </p:spPr>
+      </p:pic>
+      <p:pic>
+        <p:nvPicPr>
+          <p:cNvPr id="3" name="Imagem 2"/>
+          <p:cNvPicPr>
+            <a:picLocks noChangeAspect="1"/>
+          </p:cNvPicPr>
+          <p:nvPr/>
+        </p:nvPicPr>
+        <p:blipFill>
+          <a:blip r:embed="rId19" cstate="print">
+            <a:extLst>
+              <a:ext uri="{28A0092B-C50C-407E-A947-70E740481C1C}">
+                <a14:useLocalDpi xmlns:a14="http://schemas.microsoft.com/office/drawing/2010/main" val="0"/>
+              </a:ext>
+            </a:extLst>
+          </a:blip>
+          <a:stretch>
+            <a:fillRect/>
+          </a:stretch>
+        </p:blipFill>
+        <p:spPr>
+          <a:xfrm flipV="1">
+            <a:off x="7155805" y="1554076"/>
+            <a:ext cx="905436" cy="905436"/>
+          </a:xfrm>
+          <a:prstGeom prst="rect">
+            <a:avLst/>
+          </a:prstGeom>
+        </p:spPr>
+      </p:pic>
     </p:spTree>
     <p:extLst>
       <p:ext uri="{BB962C8B-B14F-4D97-AF65-F5344CB8AC3E}">
-        <p14:creationId xmlns:p14="http://schemas.microsoft.com/office/powerpoint/2010/main" val="3841205610"/>
+        <p14:creationId xmlns:p14="http://schemas.microsoft.com/office/powerpoint/2010/main" val="2710150448"/>
       </p:ext>
     </p:extLst>
   </p:cSld>

</xml_diff>